<commit_message>
upload a uncompleted version of poster
</commit_message>
<xml_diff>
--- a/docs/myPoster.pptx
+++ b/docs/myPoster.pptx
@@ -302,7 +302,7 @@
           <a:p>
             <a:fld id="{FB2106FF-3511-46BC-A318-6C9642C43246}" type="datetimeFigureOut">
               <a:rPr lang="en-US" smtClean="0"/>
-              <a:t>7/15/2024</a:t>
+              <a:t>7/16/2024</a:t>
             </a:fld>
             <a:endParaRPr lang="en-US"/>
           </a:p>
@@ -465,7 +465,7 @@
           <a:p>
             <a:fld id="{FB2106FF-3511-46BC-A318-6C9642C43246}" type="datetimeFigureOut">
               <a:rPr lang="en-US" smtClean="0"/>
-              <a:t>7/15/2024</a:t>
+              <a:t>7/16/2024</a:t>
             </a:fld>
             <a:endParaRPr lang="en-US"/>
           </a:p>
@@ -638,7 +638,7 @@
           <a:p>
             <a:fld id="{FB2106FF-3511-46BC-A318-6C9642C43246}" type="datetimeFigureOut">
               <a:rPr lang="en-US" smtClean="0"/>
-              <a:t>7/15/2024</a:t>
+              <a:t>7/16/2024</a:t>
             </a:fld>
             <a:endParaRPr lang="en-US"/>
           </a:p>
@@ -801,7 +801,7 @@
           <a:p>
             <a:fld id="{FB2106FF-3511-46BC-A318-6C9642C43246}" type="datetimeFigureOut">
               <a:rPr lang="en-US" smtClean="0"/>
-              <a:t>7/15/2024</a:t>
+              <a:t>7/16/2024</a:t>
             </a:fld>
             <a:endParaRPr lang="en-US"/>
           </a:p>
@@ -1041,7 +1041,7 @@
           <a:p>
             <a:fld id="{FB2106FF-3511-46BC-A318-6C9642C43246}" type="datetimeFigureOut">
               <a:rPr lang="en-US" smtClean="0"/>
-              <a:t>7/15/2024</a:t>
+              <a:t>7/16/2024</a:t>
             </a:fld>
             <a:endParaRPr lang="en-US"/>
           </a:p>
@@ -1321,7 +1321,7 @@
           <a:p>
             <a:fld id="{FB2106FF-3511-46BC-A318-6C9642C43246}" type="datetimeFigureOut">
               <a:rPr lang="en-US" smtClean="0"/>
-              <a:t>7/15/2024</a:t>
+              <a:t>7/16/2024</a:t>
             </a:fld>
             <a:endParaRPr lang="en-US"/>
           </a:p>
@@ -1740,7 +1740,7 @@
           <a:p>
             <a:fld id="{FB2106FF-3511-46BC-A318-6C9642C43246}" type="datetimeFigureOut">
               <a:rPr lang="en-US" smtClean="0"/>
-              <a:t>7/15/2024</a:t>
+              <a:t>7/16/2024</a:t>
             </a:fld>
             <a:endParaRPr lang="en-US"/>
           </a:p>
@@ -1852,7 +1852,7 @@
           <a:p>
             <a:fld id="{FB2106FF-3511-46BC-A318-6C9642C43246}" type="datetimeFigureOut">
               <a:rPr lang="en-US" smtClean="0"/>
-              <a:t>7/15/2024</a:t>
+              <a:t>7/16/2024</a:t>
             </a:fld>
             <a:endParaRPr lang="en-US"/>
           </a:p>
@@ -1942,7 +1942,7 @@
           <a:p>
             <a:fld id="{FB2106FF-3511-46BC-A318-6C9642C43246}" type="datetimeFigureOut">
               <a:rPr lang="en-US" smtClean="0"/>
-              <a:t>7/15/2024</a:t>
+              <a:t>7/16/2024</a:t>
             </a:fld>
             <a:endParaRPr lang="en-US"/>
           </a:p>
@@ -2212,7 +2212,7 @@
           <a:p>
             <a:fld id="{FB2106FF-3511-46BC-A318-6C9642C43246}" type="datetimeFigureOut">
               <a:rPr lang="en-US" smtClean="0"/>
-              <a:t>7/15/2024</a:t>
+              <a:t>7/16/2024</a:t>
             </a:fld>
             <a:endParaRPr lang="en-US"/>
           </a:p>
@@ -2459,7 +2459,7 @@
           <a:p>
             <a:fld id="{FB2106FF-3511-46BC-A318-6C9642C43246}" type="datetimeFigureOut">
               <a:rPr lang="en-US" smtClean="0"/>
-              <a:t>7/15/2024</a:t>
+              <a:t>7/16/2024</a:t>
             </a:fld>
             <a:endParaRPr lang="en-US"/>
           </a:p>
@@ -2665,7 +2665,7 @@
           <a:p>
             <a:fld id="{FB2106FF-3511-46BC-A318-6C9642C43246}" type="datetimeFigureOut">
               <a:rPr lang="en-US" smtClean="0"/>
-              <a:t>7/15/2024</a:t>
+              <a:t>7/16/2024</a:t>
             </a:fld>
             <a:endParaRPr lang="en-US"/>
           </a:p>
@@ -3386,7 +3386,7 @@
           </a:prstGeom>
           <a:solidFill>
             <a:schemeClr val="bg1">
-              <a:alpha val="20000"/>
+              <a:alpha val="40000"/>
             </a:schemeClr>
           </a:solidFill>
           <a:ln>
@@ -3515,7 +3515,7 @@
         </p:blipFill>
         <p:spPr>
           <a:xfrm>
-            <a:off x="8467" y="5715000"/>
+            <a:off x="160866" y="5715000"/>
             <a:ext cx="2048934" cy="1235370"/>
           </a:xfrm>
           <a:prstGeom prst="rect">
@@ -3537,7 +3537,7 @@
         </p:nvSpPr>
         <p:spPr>
           <a:xfrm>
-            <a:off x="8467" y="6963070"/>
+            <a:off x="160866" y="6963070"/>
             <a:ext cx="2048934" cy="2185214"/>
           </a:xfrm>
           <a:prstGeom prst="rect">
@@ -3545,7 +3545,7 @@
           </a:prstGeom>
           <a:solidFill>
             <a:schemeClr val="bg1">
-              <a:alpha val="20000"/>
+              <a:alpha val="40000"/>
             </a:schemeClr>
           </a:solidFill>
         </p:spPr>
@@ -3566,6 +3566,567 @@
               <a:t>This ROC curve chart shows the performance of multiple features in a binary classification model. The horizontal axis represents idiosyncrasy, and the vertical axis represents sensitivity. Each curve represents the idiosyncrasy and sensitivity of a feature at various thresholds. The closer the curve is to the top left corner, the better the classification performance of that feature. For example, Nat, efficiency mean, Mark var, and Years to Olympics can effectively distinguish between positive and negative samples, while Mark mean and current match ranking mean may still be useful in some cases but might need to be combined with other features or optimized through feature engineering.</a:t>
             </a:r>
             <a:endParaRPr lang="zh-CN" altLang="en-US" sz="800" dirty="0">
+              <a:solidFill>
+                <a:schemeClr val="tx2">
+                  <a:lumMod val="50000"/>
+                </a:schemeClr>
+              </a:solidFill>
+            </a:endParaRPr>
+          </a:p>
+        </p:txBody>
+      </p:sp>
+      <p:sp>
+        <p:nvSpPr>
+          <p:cNvPr id="9" name="TextBox 8">
+            <a:extLst>
+              <a:ext uri="{FF2B5EF4-FFF2-40B4-BE49-F238E27FC236}">
+                <a16:creationId xmlns:a16="http://schemas.microsoft.com/office/drawing/2014/main" id="{0133BCEC-666D-BF54-9829-A0331D9AAE23}"/>
+              </a:ext>
+            </a:extLst>
+          </p:cNvPr>
+          <p:cNvSpPr txBox="1"/>
+          <p:nvPr/>
+        </p:nvSpPr>
+        <p:spPr>
+          <a:xfrm>
+            <a:off x="304800" y="1556930"/>
+            <a:ext cx="2666153" cy="707886"/>
+          </a:xfrm>
+          <a:prstGeom prst="rect">
+            <a:avLst/>
+          </a:prstGeom>
+          <a:solidFill>
+            <a:schemeClr val="bg1">
+              <a:alpha val="40000"/>
+            </a:schemeClr>
+          </a:solidFill>
+        </p:spPr>
+        <p:txBody>
+          <a:bodyPr wrap="square">
+            <a:spAutoFit/>
+          </a:bodyPr>
+          <a:lstStyle/>
+          <a:p>
+            <a:pPr algn="just"/>
+            <a:r>
+              <a:rPr lang="en-US" altLang="zh-CN" sz="800" b="1" dirty="0">
+                <a:solidFill>
+                  <a:schemeClr val="tx2">
+                    <a:lumMod val="50000"/>
+                  </a:schemeClr>
+                </a:solidFill>
+              </a:rPr>
+              <a:t>Hypothesis:</a:t>
+            </a:r>
+            <a:endParaRPr lang="zh-CN" altLang="zh-CN" sz="800" b="1" dirty="0">
+              <a:solidFill>
+                <a:schemeClr val="tx2">
+                  <a:lumMod val="50000"/>
+                </a:schemeClr>
+              </a:solidFill>
+            </a:endParaRPr>
+          </a:p>
+          <a:p>
+            <a:pPr algn="just"/>
+            <a:r>
+              <a:rPr lang="en-US" altLang="zh-CN" sz="800" dirty="0">
+                <a:solidFill>
+                  <a:schemeClr val="tx2">
+                    <a:lumMod val="50000"/>
+                  </a:schemeClr>
+                </a:solidFill>
+              </a:rPr>
+              <a:t>Whether an athlete reaches the final is determined by the form (performance) of the previous four years of competition, ignoring the effects of possible missed plays and opponent specificity in the actual Olympic competition.</a:t>
+            </a:r>
+            <a:endParaRPr lang="zh-CN" altLang="zh-CN" sz="800" dirty="0">
+              <a:solidFill>
+                <a:schemeClr val="tx2">
+                  <a:lumMod val="50000"/>
+                </a:schemeClr>
+              </a:solidFill>
+            </a:endParaRPr>
+          </a:p>
+        </p:txBody>
+      </p:sp>
+      <p:sp>
+        <p:nvSpPr>
+          <p:cNvPr id="13" name="TextBox 12">
+            <a:extLst>
+              <a:ext uri="{FF2B5EF4-FFF2-40B4-BE49-F238E27FC236}">
+                <a16:creationId xmlns:a16="http://schemas.microsoft.com/office/drawing/2014/main" id="{0876D1E4-ADA5-9D95-3872-FDA7717050DC}"/>
+              </a:ext>
+            </a:extLst>
+          </p:cNvPr>
+          <p:cNvSpPr txBox="1"/>
+          <p:nvPr/>
+        </p:nvSpPr>
+        <p:spPr>
+          <a:xfrm>
+            <a:off x="2391834" y="7939488"/>
+            <a:ext cx="3475566" cy="1200329"/>
+          </a:xfrm>
+          <a:prstGeom prst="rect">
+            <a:avLst/>
+          </a:prstGeom>
+          <a:solidFill>
+            <a:schemeClr val="bg1">
+              <a:alpha val="40000"/>
+            </a:schemeClr>
+          </a:solidFill>
+        </p:spPr>
+        <p:txBody>
+          <a:bodyPr wrap="square">
+            <a:spAutoFit/>
+          </a:bodyPr>
+          <a:lstStyle/>
+          <a:p>
+            <a:r>
+              <a:rPr lang="en-US" altLang="zh-CN" sz="800" dirty="0">
+                <a:solidFill>
+                  <a:schemeClr val="tx2">
+                    <a:lumMod val="50000"/>
+                  </a:schemeClr>
+                </a:solidFill>
+              </a:rPr>
+              <a:t>This table presents the correlation coefficients between various features related to Olympic Ranking and Finalist Weight. The coefficients are shown along with their significance levels, indicated by asterisks where *** denotes significance at the 1% level, ** at the 5% level, and * at the 10% level. For example, Olympic Ranking and Finalist Weight have a strong positive correlation (0.893) with high statistical significance (***). Other notable correlations include Average Net Result mean (0.282) and Mark mean (0.319) with Olympic Ranking, both significant at the 1% level. This data suggests significant relationships between these features and the dependent variables.</a:t>
+            </a:r>
+            <a:endParaRPr lang="zh-CN" altLang="en-US" sz="800" dirty="0">
+              <a:solidFill>
+                <a:schemeClr val="tx2">
+                  <a:lumMod val="50000"/>
+                </a:schemeClr>
+              </a:solidFill>
+            </a:endParaRPr>
+          </a:p>
+        </p:txBody>
+      </p:sp>
+      <p:pic>
+        <p:nvPicPr>
+          <p:cNvPr id="14" name="图片 2" descr="2a40d8b01ec532ba3ac903ad1acbafb">
+            <a:extLst>
+              <a:ext uri="{FF2B5EF4-FFF2-40B4-BE49-F238E27FC236}">
+                <a16:creationId xmlns:a16="http://schemas.microsoft.com/office/drawing/2014/main" id="{BA410A7D-20FC-25BC-CDD7-2489718CB214}"/>
+              </a:ext>
+            </a:extLst>
+          </p:cNvPr>
+          <p:cNvPicPr>
+            <a:picLocks noChangeAspect="1"/>
+          </p:cNvPicPr>
+          <p:nvPr/>
+        </p:nvPicPr>
+        <p:blipFill>
+          <a:blip r:embed="rId5"/>
+          <a:stretch>
+            <a:fillRect/>
+          </a:stretch>
+        </p:blipFill>
+        <p:spPr>
+          <a:xfrm>
+            <a:off x="2381250" y="6705600"/>
+            <a:ext cx="3467099" cy="1254459"/>
+          </a:xfrm>
+          <a:prstGeom prst="rect">
+            <a:avLst/>
+          </a:prstGeom>
+        </p:spPr>
+      </p:pic>
+      <p:sp>
+        <p:nvSpPr>
+          <p:cNvPr id="16" name="TextBox 15">
+            <a:extLst>
+              <a:ext uri="{FF2B5EF4-FFF2-40B4-BE49-F238E27FC236}">
+                <a16:creationId xmlns:a16="http://schemas.microsoft.com/office/drawing/2014/main" id="{23EFAE39-CA08-1090-AFA7-FC3A17C9049D}"/>
+              </a:ext>
+            </a:extLst>
+          </p:cNvPr>
+          <p:cNvSpPr txBox="1"/>
+          <p:nvPr/>
+        </p:nvSpPr>
+        <p:spPr>
+          <a:xfrm>
+            <a:off x="304800" y="2554512"/>
+            <a:ext cx="1209884" cy="1692771"/>
+          </a:xfrm>
+          <a:prstGeom prst="rect">
+            <a:avLst/>
+          </a:prstGeom>
+          <a:solidFill>
+            <a:schemeClr val="bg1">
+              <a:alpha val="40000"/>
+            </a:schemeClr>
+          </a:solidFill>
+        </p:spPr>
+        <p:txBody>
+          <a:bodyPr wrap="square">
+            <a:spAutoFit/>
+          </a:bodyPr>
+          <a:lstStyle/>
+          <a:p>
+            <a:pPr algn="just"/>
+            <a:r>
+              <a:rPr lang="en-US" altLang="zh-CN" sz="800" b="1">
+                <a:solidFill>
+                  <a:schemeClr val="tx2">
+                    <a:lumMod val="50000"/>
+                  </a:schemeClr>
+                </a:solidFill>
+              </a:rPr>
+              <a:t>Influencing Factors:</a:t>
+            </a:r>
+            <a:endParaRPr lang="zh-CN" altLang="zh-CN" sz="800" b="1">
+              <a:solidFill>
+                <a:schemeClr val="tx2">
+                  <a:lumMod val="50000"/>
+                </a:schemeClr>
+              </a:solidFill>
+            </a:endParaRPr>
+          </a:p>
+          <a:p>
+            <a:pPr algn="just"/>
+            <a:r>
+              <a:rPr lang="en-US" altLang="zh-CN" sz="800">
+                <a:solidFill>
+                  <a:schemeClr val="tx2">
+                    <a:lumMod val="50000"/>
+                  </a:schemeClr>
+                </a:solidFill>
+              </a:rPr>
+              <a:t>Age at event</a:t>
+            </a:r>
+            <a:endParaRPr lang="zh-CN" altLang="zh-CN" sz="800">
+              <a:solidFill>
+                <a:schemeClr val="tx2">
+                  <a:lumMod val="50000"/>
+                </a:schemeClr>
+              </a:solidFill>
+            </a:endParaRPr>
+          </a:p>
+          <a:p>
+            <a:pPr algn="just"/>
+            <a:r>
+              <a:rPr lang="en-US" altLang="zh-CN" sz="800">
+                <a:solidFill>
+                  <a:schemeClr val="tx2">
+                    <a:lumMod val="50000"/>
+                  </a:schemeClr>
+                </a:solidFill>
+              </a:rPr>
+              <a:t>Average Net Result mean</a:t>
+            </a:r>
+            <a:endParaRPr lang="zh-CN" altLang="zh-CN" sz="800">
+              <a:solidFill>
+                <a:schemeClr val="tx2">
+                  <a:lumMod val="50000"/>
+                </a:schemeClr>
+              </a:solidFill>
+            </a:endParaRPr>
+          </a:p>
+          <a:p>
+            <a:pPr algn="just"/>
+            <a:r>
+              <a:rPr lang="en-US" altLang="zh-CN" sz="800">
+                <a:solidFill>
+                  <a:schemeClr val="tx2">
+                    <a:lumMod val="50000"/>
+                  </a:schemeClr>
+                </a:solidFill>
+              </a:rPr>
+              <a:t>Mean mark</a:t>
+            </a:r>
+            <a:endParaRPr lang="zh-CN" altLang="zh-CN" sz="800">
+              <a:solidFill>
+                <a:schemeClr val="tx2">
+                  <a:lumMod val="50000"/>
+                </a:schemeClr>
+              </a:solidFill>
+            </a:endParaRPr>
+          </a:p>
+          <a:p>
+            <a:pPr algn="just"/>
+            <a:r>
+              <a:rPr lang="en-US" altLang="zh-CN" sz="800">
+                <a:solidFill>
+                  <a:schemeClr val="tx2">
+                    <a:lumMod val="50000"/>
+                  </a:schemeClr>
+                </a:solidFill>
+              </a:rPr>
+              <a:t>Best mark(min)</a:t>
+            </a:r>
+            <a:endParaRPr lang="zh-CN" altLang="zh-CN" sz="800">
+              <a:solidFill>
+                <a:schemeClr val="tx2">
+                  <a:lumMod val="50000"/>
+                </a:schemeClr>
+              </a:solidFill>
+            </a:endParaRPr>
+          </a:p>
+          <a:p>
+            <a:pPr algn="just"/>
+            <a:r>
+              <a:rPr lang="en-US" altLang="zh-CN" sz="800">
+                <a:solidFill>
+                  <a:schemeClr val="tx2">
+                    <a:lumMod val="50000"/>
+                  </a:schemeClr>
+                </a:solidFill>
+              </a:rPr>
+              <a:t>Variance of the mark</a:t>
+            </a:r>
+            <a:endParaRPr lang="zh-CN" altLang="zh-CN" sz="800">
+              <a:solidFill>
+                <a:schemeClr val="tx2">
+                  <a:lumMod val="50000"/>
+                </a:schemeClr>
+              </a:solidFill>
+            </a:endParaRPr>
+          </a:p>
+          <a:p>
+            <a:pPr algn="just"/>
+            <a:r>
+              <a:rPr lang="en-US" altLang="zh-CN" sz="800">
+                <a:solidFill>
+                  <a:schemeClr val="tx2">
+                    <a:lumMod val="50000"/>
+                  </a:schemeClr>
+                </a:solidFill>
+              </a:rPr>
+              <a:t>Mean match ranking</a:t>
+            </a:r>
+            <a:endParaRPr lang="zh-CN" altLang="zh-CN" sz="800">
+              <a:solidFill>
+                <a:schemeClr val="tx2">
+                  <a:lumMod val="50000"/>
+                </a:schemeClr>
+              </a:solidFill>
+            </a:endParaRPr>
+          </a:p>
+          <a:p>
+            <a:pPr algn="just"/>
+            <a:r>
+              <a:rPr lang="en-US" altLang="zh-CN" sz="800">
+                <a:solidFill>
+                  <a:schemeClr val="tx2">
+                    <a:lumMod val="50000"/>
+                  </a:schemeClr>
+                </a:solidFill>
+              </a:rPr>
+              <a:t>Best match ranking(min)</a:t>
+            </a:r>
+            <a:endParaRPr lang="zh-CN" altLang="zh-CN" sz="800">
+              <a:solidFill>
+                <a:schemeClr val="tx2">
+                  <a:lumMod val="50000"/>
+                </a:schemeClr>
+              </a:solidFill>
+            </a:endParaRPr>
+          </a:p>
+          <a:p>
+            <a:pPr algn="just"/>
+            <a:r>
+              <a:rPr lang="en-US" altLang="zh-CN" sz="800">
+                <a:solidFill>
+                  <a:schemeClr val="tx2">
+                    <a:lumMod val="50000"/>
+                  </a:schemeClr>
+                </a:solidFill>
+              </a:rPr>
+              <a:t>Average Rank mean</a:t>
+            </a:r>
+            <a:endParaRPr lang="zh-CN" altLang="zh-CN" sz="800">
+              <a:solidFill>
+                <a:schemeClr val="tx2">
+                  <a:lumMod val="50000"/>
+                </a:schemeClr>
+              </a:solidFill>
+            </a:endParaRPr>
+          </a:p>
+          <a:p>
+            <a:pPr algn="just"/>
+            <a:r>
+              <a:rPr lang="en-US" altLang="zh-CN" sz="800">
+                <a:solidFill>
+                  <a:schemeClr val="tx2">
+                    <a:lumMod val="50000"/>
+                  </a:schemeClr>
+                </a:solidFill>
+              </a:rPr>
+              <a:t>Mean efficiency</a:t>
+            </a:r>
+            <a:endParaRPr lang="zh-CN" altLang="zh-CN" sz="800">
+              <a:solidFill>
+                <a:schemeClr val="tx2">
+                  <a:lumMod val="50000"/>
+                </a:schemeClr>
+              </a:solidFill>
+            </a:endParaRPr>
+          </a:p>
+          <a:p>
+            <a:pPr algn="just"/>
+            <a:r>
+              <a:rPr lang="en-US" altLang="zh-CN" sz="800">
+                <a:solidFill>
+                  <a:schemeClr val="tx2">
+                    <a:lumMod val="50000"/>
+                  </a:schemeClr>
+                </a:solidFill>
+              </a:rPr>
+              <a:t>Nation Score</a:t>
+            </a:r>
+            <a:endParaRPr lang="zh-CN" altLang="zh-CN" sz="800">
+              <a:solidFill>
+                <a:schemeClr val="tx2">
+                  <a:lumMod val="50000"/>
+                </a:schemeClr>
+              </a:solidFill>
+            </a:endParaRPr>
+          </a:p>
+          <a:p>
+            <a:pPr algn="just"/>
+            <a:r>
+              <a:rPr lang="en-US" altLang="zh-CN" sz="800">
+                <a:solidFill>
+                  <a:schemeClr val="tx2">
+                    <a:lumMod val="50000"/>
+                  </a:schemeClr>
+                </a:solidFill>
+              </a:rPr>
+              <a:t>Years to Olympics</a:t>
+            </a:r>
+            <a:endParaRPr lang="zh-CN" altLang="zh-CN" sz="800" dirty="0">
+              <a:solidFill>
+                <a:schemeClr val="tx2">
+                  <a:lumMod val="50000"/>
+                </a:schemeClr>
+              </a:solidFill>
+            </a:endParaRPr>
+          </a:p>
+        </p:txBody>
+      </p:sp>
+      <p:sp>
+        <p:nvSpPr>
+          <p:cNvPr id="18" name="TextBox 17">
+            <a:extLst>
+              <a:ext uri="{FF2B5EF4-FFF2-40B4-BE49-F238E27FC236}">
+                <a16:creationId xmlns:a16="http://schemas.microsoft.com/office/drawing/2014/main" id="{0237170B-61B4-EC53-598A-9A058B502E30}"/>
+              </a:ext>
+            </a:extLst>
+          </p:cNvPr>
+          <p:cNvSpPr txBox="1"/>
+          <p:nvPr/>
+        </p:nvSpPr>
+        <p:spPr>
+          <a:xfrm>
+            <a:off x="304800" y="4639426"/>
+            <a:ext cx="1890183" cy="707886"/>
+          </a:xfrm>
+          <a:prstGeom prst="rect">
+            <a:avLst/>
+          </a:prstGeom>
+          <a:solidFill>
+            <a:schemeClr val="bg1">
+              <a:alpha val="40000"/>
+            </a:schemeClr>
+          </a:solidFill>
+        </p:spPr>
+        <p:txBody>
+          <a:bodyPr wrap="square">
+            <a:spAutoFit/>
+          </a:bodyPr>
+          <a:lstStyle/>
+          <a:p>
+            <a:pPr algn="just"/>
+            <a:r>
+              <a:rPr lang="en-US" altLang="zh-CN" sz="800" dirty="0">
+                <a:solidFill>
+                  <a:schemeClr val="tx2">
+                    <a:lumMod val="50000"/>
+                  </a:schemeClr>
+                </a:solidFill>
+              </a:rPr>
+              <a:t>Characteristic engineering</a:t>
+            </a:r>
+            <a:endParaRPr lang="zh-CN" altLang="zh-CN" sz="800" dirty="0">
+              <a:solidFill>
+                <a:schemeClr val="tx2">
+                  <a:lumMod val="50000"/>
+                </a:schemeClr>
+              </a:solidFill>
+            </a:endParaRPr>
+          </a:p>
+          <a:p>
+            <a:pPr algn="just"/>
+            <a:r>
+              <a:rPr lang="en-US" altLang="zh-CN" sz="800" dirty="0">
+                <a:solidFill>
+                  <a:schemeClr val="tx2">
+                    <a:lumMod val="50000"/>
+                  </a:schemeClr>
+                </a:solidFill>
+              </a:rPr>
+              <a:t>Handling of outliers and missing values</a:t>
+            </a:r>
+            <a:endParaRPr lang="zh-CN" altLang="zh-CN" sz="800" dirty="0">
+              <a:solidFill>
+                <a:schemeClr val="tx2">
+                  <a:lumMod val="50000"/>
+                </a:schemeClr>
+              </a:solidFill>
+            </a:endParaRPr>
+          </a:p>
+          <a:p>
+            <a:pPr algn="just"/>
+            <a:r>
+              <a:rPr lang="en-US" altLang="zh-CN" sz="800" dirty="0">
+                <a:solidFill>
+                  <a:schemeClr val="tx2">
+                    <a:lumMod val="50000"/>
+                  </a:schemeClr>
+                </a:solidFill>
+              </a:rPr>
+              <a:t>Data formatting</a:t>
+            </a:r>
+            <a:endParaRPr lang="zh-CN" altLang="zh-CN" sz="800" dirty="0">
+              <a:solidFill>
+                <a:schemeClr val="tx2">
+                  <a:lumMod val="50000"/>
+                </a:schemeClr>
+              </a:solidFill>
+            </a:endParaRPr>
+          </a:p>
+          <a:p>
+            <a:pPr algn="just"/>
+            <a:r>
+              <a:rPr lang="en-US" altLang="zh-CN" sz="800" dirty="0">
+                <a:solidFill>
+                  <a:schemeClr val="tx2">
+                    <a:lumMod val="50000"/>
+                  </a:schemeClr>
+                </a:solidFill>
+              </a:rPr>
+              <a:t>normalization of data</a:t>
+            </a:r>
+            <a:endParaRPr lang="zh-CN" altLang="zh-CN" sz="800" dirty="0">
+              <a:solidFill>
+                <a:schemeClr val="tx2">
+                  <a:lumMod val="50000"/>
+                </a:schemeClr>
+              </a:solidFill>
+            </a:endParaRPr>
+          </a:p>
+          <a:p>
+            <a:pPr algn="just"/>
+            <a:r>
+              <a:rPr lang="en-US" altLang="zh-CN" sz="800" dirty="0">
+                <a:solidFill>
+                  <a:schemeClr val="tx2">
+                    <a:lumMod val="50000"/>
+                  </a:schemeClr>
+                </a:solidFill>
+              </a:rPr>
+              <a:t>Pearson correlation analysis</a:t>
+            </a:r>
+            <a:endParaRPr lang="zh-CN" altLang="zh-CN" sz="800" dirty="0">
               <a:solidFill>
                 <a:schemeClr val="tx2">
                   <a:lumMod val="50000"/>

</xml_diff>

<commit_message>
Upload the 1.0 version of poster
</commit_message>
<xml_diff>
--- a/docs/myPoster.pptx
+++ b/docs/myPoster.pptx
@@ -3378,7 +3378,7 @@
         </p:nvSpPr>
         <p:spPr>
           <a:xfrm>
-            <a:off x="6053668" y="8266986"/>
+            <a:off x="5721776" y="7983781"/>
             <a:ext cx="876299" cy="861774"/>
           </a:xfrm>
           <a:prstGeom prst="rect">
@@ -3515,20 +3515,30 @@
         </p:blipFill>
         <p:spPr>
           <a:xfrm>
-            <a:off x="160866" y="5715000"/>
-            <a:ext cx="2048934" cy="1235370"/>
+            <a:off x="221687" y="4404431"/>
+            <a:ext cx="3258113" cy="1964424"/>
           </a:xfrm>
           <a:prstGeom prst="rect">
             <a:avLst/>
           </a:prstGeom>
+          <a:ln>
+            <a:noFill/>
+          </a:ln>
+          <a:effectLst>
+            <a:outerShdw blurRad="292100" dist="139700" dir="2700000" algn="tl" rotWithShape="0">
+              <a:srgbClr val="333333">
+                <a:alpha val="65000"/>
+              </a:srgbClr>
+            </a:outerShdw>
+          </a:effectLst>
         </p:spPr>
       </p:pic>
       <p:sp>
         <p:nvSpPr>
-          <p:cNvPr id="11" name="TextBox 10">
+          <p:cNvPr id="9" name="TextBox 8">
             <a:extLst>
               <a:ext uri="{FF2B5EF4-FFF2-40B4-BE49-F238E27FC236}">
-                <a16:creationId xmlns:a16="http://schemas.microsoft.com/office/drawing/2014/main" id="{ED116D78-E4EC-52DD-E28E-F2D464957000}"/>
+                <a16:creationId xmlns:a16="http://schemas.microsoft.com/office/drawing/2014/main" id="{0133BCEC-666D-BF54-9829-A0331D9AAE23}"/>
               </a:ext>
             </a:extLst>
           </p:cNvPr>
@@ -3537,8 +3547,8 @@
         </p:nvSpPr>
         <p:spPr>
           <a:xfrm>
-            <a:off x="160866" y="6963070"/>
-            <a:ext cx="2048934" cy="2185214"/>
+            <a:off x="304800" y="1556930"/>
+            <a:ext cx="2895600" cy="707886"/>
           </a:xfrm>
           <a:prstGeom prst="rect">
             <a:avLst/>
@@ -3555,58 +3565,6 @@
           </a:bodyPr>
           <a:lstStyle/>
           <a:p>
-            <a:r>
-              <a:rPr lang="en-US" altLang="zh-CN" sz="800" dirty="0">
-                <a:solidFill>
-                  <a:schemeClr val="tx2">
-                    <a:lumMod val="50000"/>
-                  </a:schemeClr>
-                </a:solidFill>
-              </a:rPr>
-              <a:t>This ROC curve chart shows the performance of multiple features in a binary classification model. The horizontal axis represents idiosyncrasy, and the vertical axis represents sensitivity. Each curve represents the idiosyncrasy and sensitivity of a feature at various thresholds. The closer the curve is to the top left corner, the better the classification performance of that feature. For example, Nat, efficiency mean, Mark var, and Years to Olympics can effectively distinguish between positive and negative samples, while Mark mean and current match ranking mean may still be useful in some cases but might need to be combined with other features or optimized through feature engineering.</a:t>
-            </a:r>
-            <a:endParaRPr lang="zh-CN" altLang="en-US" sz="800" dirty="0">
-              <a:solidFill>
-                <a:schemeClr val="tx2">
-                  <a:lumMod val="50000"/>
-                </a:schemeClr>
-              </a:solidFill>
-            </a:endParaRPr>
-          </a:p>
-        </p:txBody>
-      </p:sp>
-      <p:sp>
-        <p:nvSpPr>
-          <p:cNvPr id="9" name="TextBox 8">
-            <a:extLst>
-              <a:ext uri="{FF2B5EF4-FFF2-40B4-BE49-F238E27FC236}">
-                <a16:creationId xmlns:a16="http://schemas.microsoft.com/office/drawing/2014/main" id="{0133BCEC-666D-BF54-9829-A0331D9AAE23}"/>
-              </a:ext>
-            </a:extLst>
-          </p:cNvPr>
-          <p:cNvSpPr txBox="1"/>
-          <p:nvPr/>
-        </p:nvSpPr>
-        <p:spPr>
-          <a:xfrm>
-            <a:off x="304800" y="1556930"/>
-            <a:ext cx="2666153" cy="707886"/>
-          </a:xfrm>
-          <a:prstGeom prst="rect">
-            <a:avLst/>
-          </a:prstGeom>
-          <a:solidFill>
-            <a:schemeClr val="bg1">
-              <a:alpha val="40000"/>
-            </a:schemeClr>
-          </a:solidFill>
-        </p:spPr>
-        <p:txBody>
-          <a:bodyPr wrap="square">
-            <a:spAutoFit/>
-          </a:bodyPr>
-          <a:lstStyle/>
-          <a:p>
             <a:pPr algn="just"/>
             <a:r>
               <a:rPr lang="en-US" altLang="zh-CN" sz="800" b="1" dirty="0">
@@ -3639,58 +3597,6 @@
               <a:t>Whether an athlete reaches the final is determined by the form (performance) of the previous four years of competition, ignoring the effects of possible missed plays and opponent specificity in the actual Olympic competition.</a:t>
             </a:r>
             <a:endParaRPr lang="zh-CN" altLang="zh-CN" sz="800" dirty="0">
-              <a:solidFill>
-                <a:schemeClr val="tx2">
-                  <a:lumMod val="50000"/>
-                </a:schemeClr>
-              </a:solidFill>
-            </a:endParaRPr>
-          </a:p>
-        </p:txBody>
-      </p:sp>
-      <p:sp>
-        <p:nvSpPr>
-          <p:cNvPr id="13" name="TextBox 12">
-            <a:extLst>
-              <a:ext uri="{FF2B5EF4-FFF2-40B4-BE49-F238E27FC236}">
-                <a16:creationId xmlns:a16="http://schemas.microsoft.com/office/drawing/2014/main" id="{0876D1E4-ADA5-9D95-3872-FDA7717050DC}"/>
-              </a:ext>
-            </a:extLst>
-          </p:cNvPr>
-          <p:cNvSpPr txBox="1"/>
-          <p:nvPr/>
-        </p:nvSpPr>
-        <p:spPr>
-          <a:xfrm>
-            <a:off x="2391834" y="7939488"/>
-            <a:ext cx="3475566" cy="1200329"/>
-          </a:xfrm>
-          <a:prstGeom prst="rect">
-            <a:avLst/>
-          </a:prstGeom>
-          <a:solidFill>
-            <a:schemeClr val="bg1">
-              <a:alpha val="40000"/>
-            </a:schemeClr>
-          </a:solidFill>
-        </p:spPr>
-        <p:txBody>
-          <a:bodyPr wrap="square">
-            <a:spAutoFit/>
-          </a:bodyPr>
-          <a:lstStyle/>
-          <a:p>
-            <a:r>
-              <a:rPr lang="en-US" altLang="zh-CN" sz="800" dirty="0">
-                <a:solidFill>
-                  <a:schemeClr val="tx2">
-                    <a:lumMod val="50000"/>
-                  </a:schemeClr>
-                </a:solidFill>
-              </a:rPr>
-              <a:t>This table presents the correlation coefficients between various features related to Olympic Ranking and Finalist Weight. The coefficients are shown along with their significance levels, indicated by asterisks where *** denotes significance at the 1% level, ** at the 5% level, and * at the 10% level. For example, Olympic Ranking and Finalist Weight have a strong positive correlation (0.893) with high statistical significance (***). Other notable correlations include Average Net Result mean (0.282) and Mark mean (0.319) with Olympic Ranking, both significant at the 1% level. This data suggests significant relationships between these features and the dependent variables.</a:t>
-            </a:r>
-            <a:endParaRPr lang="zh-CN" altLang="en-US" sz="800" dirty="0">
               <a:solidFill>
                 <a:schemeClr val="tx2">
                   <a:lumMod val="50000"/>
@@ -3722,12 +3628,22 @@
         </p:blipFill>
         <p:spPr>
           <a:xfrm>
-            <a:off x="2381250" y="6705600"/>
-            <a:ext cx="3467099" cy="1254459"/>
+            <a:off x="215094" y="6739978"/>
+            <a:ext cx="5110397" cy="1849034"/>
           </a:xfrm>
           <a:prstGeom prst="rect">
             <a:avLst/>
           </a:prstGeom>
+          <a:ln>
+            <a:noFill/>
+          </a:ln>
+          <a:effectLst>
+            <a:outerShdw blurRad="292100" dist="139700" dir="2700000" algn="tl" rotWithShape="0">
+              <a:srgbClr val="333333">
+                <a:alpha val="65000"/>
+              </a:srgbClr>
+            </a:outerShdw>
+          </a:effectLst>
         </p:spPr>
       </p:pic>
       <p:sp>
@@ -3745,7 +3661,7 @@
         <p:spPr>
           <a:xfrm>
             <a:off x="304800" y="2554512"/>
-            <a:ext cx="1209884" cy="1692771"/>
+            <a:ext cx="1447800" cy="1569660"/>
           </a:xfrm>
           <a:prstGeom prst="rect">
             <a:avLst/>
@@ -3764,7 +3680,7 @@
           <a:p>
             <a:pPr algn="just"/>
             <a:r>
-              <a:rPr lang="en-US" altLang="zh-CN" sz="800" b="1">
+              <a:rPr lang="en-US" altLang="zh-CN" sz="800" b="1" dirty="0">
                 <a:solidFill>
                   <a:schemeClr val="tx2">
                     <a:lumMod val="50000"/>
@@ -3773,7 +3689,7 @@
               </a:rPr>
               <a:t>Influencing Factors:</a:t>
             </a:r>
-            <a:endParaRPr lang="zh-CN" altLang="zh-CN" sz="800" b="1">
+            <a:endParaRPr lang="zh-CN" altLang="zh-CN" sz="800" b="1" dirty="0">
               <a:solidFill>
                 <a:schemeClr val="tx2">
                   <a:lumMod val="50000"/>
@@ -3784,7 +3700,7 @@
           <a:p>
             <a:pPr algn="just"/>
             <a:r>
-              <a:rPr lang="en-US" altLang="zh-CN" sz="800">
+              <a:rPr lang="en-US" altLang="zh-CN" sz="800" dirty="0">
                 <a:solidFill>
                   <a:schemeClr val="tx2">
                     <a:lumMod val="50000"/>
@@ -3793,7 +3709,7 @@
               </a:rPr>
               <a:t>Age at event</a:t>
             </a:r>
-            <a:endParaRPr lang="zh-CN" altLang="zh-CN" sz="800">
+            <a:endParaRPr lang="zh-CN" altLang="zh-CN" sz="800" dirty="0">
               <a:solidFill>
                 <a:schemeClr val="tx2">
                   <a:lumMod val="50000"/>
@@ -3804,7 +3720,7 @@
           <a:p>
             <a:pPr algn="just"/>
             <a:r>
-              <a:rPr lang="en-US" altLang="zh-CN" sz="800">
+              <a:rPr lang="en-US" altLang="zh-CN" sz="800" dirty="0">
                 <a:solidFill>
                   <a:schemeClr val="tx2">
                     <a:lumMod val="50000"/>
@@ -3813,7 +3729,7 @@
               </a:rPr>
               <a:t>Average Net Result mean</a:t>
             </a:r>
-            <a:endParaRPr lang="zh-CN" altLang="zh-CN" sz="800">
+            <a:endParaRPr lang="zh-CN" altLang="zh-CN" sz="800" dirty="0">
               <a:solidFill>
                 <a:schemeClr val="tx2">
                   <a:lumMod val="50000"/>
@@ -3824,7 +3740,7 @@
           <a:p>
             <a:pPr algn="just"/>
             <a:r>
-              <a:rPr lang="en-US" altLang="zh-CN" sz="800">
+              <a:rPr lang="en-US" altLang="zh-CN" sz="800" dirty="0">
                 <a:solidFill>
                   <a:schemeClr val="tx2">
                     <a:lumMod val="50000"/>
@@ -3833,7 +3749,7 @@
               </a:rPr>
               <a:t>Mean mark</a:t>
             </a:r>
-            <a:endParaRPr lang="zh-CN" altLang="zh-CN" sz="800">
+            <a:endParaRPr lang="zh-CN" altLang="zh-CN" sz="800" dirty="0">
               <a:solidFill>
                 <a:schemeClr val="tx2">
                   <a:lumMod val="50000"/>
@@ -3844,7 +3760,7 @@
           <a:p>
             <a:pPr algn="just"/>
             <a:r>
-              <a:rPr lang="en-US" altLang="zh-CN" sz="800">
+              <a:rPr lang="en-US" altLang="zh-CN" sz="800" dirty="0">
                 <a:solidFill>
                   <a:schemeClr val="tx2">
                     <a:lumMod val="50000"/>
@@ -3853,7 +3769,7 @@
               </a:rPr>
               <a:t>Best mark(min)</a:t>
             </a:r>
-            <a:endParaRPr lang="zh-CN" altLang="zh-CN" sz="800">
+            <a:endParaRPr lang="zh-CN" altLang="zh-CN" sz="800" dirty="0">
               <a:solidFill>
                 <a:schemeClr val="tx2">
                   <a:lumMod val="50000"/>
@@ -3864,7 +3780,7 @@
           <a:p>
             <a:pPr algn="just"/>
             <a:r>
-              <a:rPr lang="en-US" altLang="zh-CN" sz="800">
+              <a:rPr lang="en-US" altLang="zh-CN" sz="800" dirty="0">
                 <a:solidFill>
                   <a:schemeClr val="tx2">
                     <a:lumMod val="50000"/>
@@ -3873,7 +3789,7 @@
               </a:rPr>
               <a:t>Variance of the mark</a:t>
             </a:r>
-            <a:endParaRPr lang="zh-CN" altLang="zh-CN" sz="800">
+            <a:endParaRPr lang="zh-CN" altLang="zh-CN" sz="800" dirty="0">
               <a:solidFill>
                 <a:schemeClr val="tx2">
                   <a:lumMod val="50000"/>
@@ -3884,7 +3800,7 @@
           <a:p>
             <a:pPr algn="just"/>
             <a:r>
-              <a:rPr lang="en-US" altLang="zh-CN" sz="800">
+              <a:rPr lang="en-US" altLang="zh-CN" sz="800" dirty="0">
                 <a:solidFill>
                   <a:schemeClr val="tx2">
                     <a:lumMod val="50000"/>
@@ -3893,7 +3809,7 @@
               </a:rPr>
               <a:t>Mean match ranking</a:t>
             </a:r>
-            <a:endParaRPr lang="zh-CN" altLang="zh-CN" sz="800">
+            <a:endParaRPr lang="zh-CN" altLang="zh-CN" sz="800" dirty="0">
               <a:solidFill>
                 <a:schemeClr val="tx2">
                   <a:lumMod val="50000"/>
@@ -3904,7 +3820,7 @@
           <a:p>
             <a:pPr algn="just"/>
             <a:r>
-              <a:rPr lang="en-US" altLang="zh-CN" sz="800">
+              <a:rPr lang="en-US" altLang="zh-CN" sz="800" dirty="0">
                 <a:solidFill>
                   <a:schemeClr val="tx2">
                     <a:lumMod val="50000"/>
@@ -3913,7 +3829,7 @@
               </a:rPr>
               <a:t>Best match ranking(min)</a:t>
             </a:r>
-            <a:endParaRPr lang="zh-CN" altLang="zh-CN" sz="800">
+            <a:endParaRPr lang="zh-CN" altLang="zh-CN" sz="800" dirty="0">
               <a:solidFill>
                 <a:schemeClr val="tx2">
                   <a:lumMod val="50000"/>
@@ -3924,7 +3840,7 @@
           <a:p>
             <a:pPr algn="just"/>
             <a:r>
-              <a:rPr lang="en-US" altLang="zh-CN" sz="800">
+              <a:rPr lang="en-US" altLang="zh-CN" sz="800" dirty="0">
                 <a:solidFill>
                   <a:schemeClr val="tx2">
                     <a:lumMod val="50000"/>
@@ -3933,7 +3849,7 @@
               </a:rPr>
               <a:t>Average Rank mean</a:t>
             </a:r>
-            <a:endParaRPr lang="zh-CN" altLang="zh-CN" sz="800">
+            <a:endParaRPr lang="zh-CN" altLang="zh-CN" sz="800" dirty="0">
               <a:solidFill>
                 <a:schemeClr val="tx2">
                   <a:lumMod val="50000"/>
@@ -3944,7 +3860,7 @@
           <a:p>
             <a:pPr algn="just"/>
             <a:r>
-              <a:rPr lang="en-US" altLang="zh-CN" sz="800">
+              <a:rPr lang="en-US" altLang="zh-CN" sz="800" dirty="0">
                 <a:solidFill>
                   <a:schemeClr val="tx2">
                     <a:lumMod val="50000"/>
@@ -3953,7 +3869,7 @@
               </a:rPr>
               <a:t>Mean efficiency</a:t>
             </a:r>
-            <a:endParaRPr lang="zh-CN" altLang="zh-CN" sz="800">
+            <a:endParaRPr lang="zh-CN" altLang="zh-CN" sz="800" dirty="0">
               <a:solidFill>
                 <a:schemeClr val="tx2">
                   <a:lumMod val="50000"/>
@@ -3964,7 +3880,7 @@
           <a:p>
             <a:pPr algn="just"/>
             <a:r>
-              <a:rPr lang="en-US" altLang="zh-CN" sz="800">
+              <a:rPr lang="en-US" altLang="zh-CN" sz="800" dirty="0">
                 <a:solidFill>
                   <a:schemeClr val="tx2">
                     <a:lumMod val="50000"/>
@@ -3973,7 +3889,7 @@
               </a:rPr>
               <a:t>Nation Score</a:t>
             </a:r>
-            <a:endParaRPr lang="zh-CN" altLang="zh-CN" sz="800">
+            <a:endParaRPr lang="zh-CN" altLang="zh-CN" sz="800" dirty="0">
               <a:solidFill>
                 <a:schemeClr val="tx2">
                   <a:lumMod val="50000"/>
@@ -3984,7 +3900,7 @@
           <a:p>
             <a:pPr algn="just"/>
             <a:r>
-              <a:rPr lang="en-US" altLang="zh-CN" sz="800">
+              <a:rPr lang="en-US" altLang="zh-CN" sz="800" dirty="0">
                 <a:solidFill>
                   <a:schemeClr val="tx2">
                     <a:lumMod val="50000"/>
@@ -4017,7 +3933,7 @@
         </p:nvSpPr>
         <p:spPr>
           <a:xfrm>
-            <a:off x="304800" y="4639426"/>
+            <a:off x="1825202" y="2580865"/>
             <a:ext cx="1890183" cy="707886"/>
           </a:xfrm>
           <a:prstGeom prst="rect">
@@ -4037,7 +3953,7 @@
           <a:p>
             <a:pPr algn="just"/>
             <a:r>
-              <a:rPr lang="en-US" altLang="zh-CN" sz="800" dirty="0">
+              <a:rPr lang="en-US" altLang="zh-CN" sz="800" b="1" dirty="0">
                 <a:solidFill>
                   <a:schemeClr val="tx2">
                     <a:lumMod val="50000"/>
@@ -4045,6 +3961,36 @@
                 </a:solidFill>
               </a:rPr>
               <a:t>Characteristic engineering</a:t>
+            </a:r>
+            <a:r>
+              <a:rPr lang="zh-CN" altLang="en-US" sz="800" b="1" dirty="0">
+                <a:solidFill>
+                  <a:schemeClr val="tx2">
+                    <a:lumMod val="50000"/>
+                  </a:schemeClr>
+                </a:solidFill>
+              </a:rPr>
+              <a:t>：</a:t>
+            </a:r>
+            <a:endParaRPr lang="zh-CN" altLang="zh-CN" sz="800" b="1" dirty="0">
+              <a:solidFill>
+                <a:schemeClr val="tx2">
+                  <a:lumMod val="50000"/>
+                </a:schemeClr>
+              </a:solidFill>
+            </a:endParaRPr>
+          </a:p>
+          <a:p>
+            <a:pPr algn="just"/>
+            <a:r>
+              <a:rPr lang="en-US" altLang="zh-CN" sz="800" dirty="0">
+                <a:solidFill>
+                  <a:schemeClr val="tx2">
+                    <a:lumMod val="50000"/>
+                  </a:schemeClr>
+                </a:solidFill>
+              </a:rPr>
+              <a:t>Handling of outliers and missing values</a:t>
             </a:r>
             <a:endParaRPr lang="zh-CN" altLang="zh-CN" sz="800" dirty="0">
               <a:solidFill>
@@ -4064,7 +4010,7 @@
                   </a:schemeClr>
                 </a:solidFill>
               </a:rPr>
-              <a:t>Handling of outliers and missing values</a:t>
+              <a:t>Data formatting</a:t>
             </a:r>
             <a:endParaRPr lang="zh-CN" altLang="zh-CN" sz="800" dirty="0">
               <a:solidFill>
@@ -4084,7 +4030,7 @@
                   </a:schemeClr>
                 </a:solidFill>
               </a:rPr>
-              <a:t>Data formatting</a:t>
+              <a:t>normalization of data</a:t>
             </a:r>
             <a:endParaRPr lang="zh-CN" altLang="zh-CN" sz="800" dirty="0">
               <a:solidFill>
@@ -4104,7 +4050,7 @@
                   </a:schemeClr>
                 </a:solidFill>
               </a:rPr>
-              <a:t>normalization of data</a:t>
+              <a:t>Pearson correlation analysis</a:t>
             </a:r>
             <a:endParaRPr lang="zh-CN" altLang="zh-CN" sz="800" dirty="0">
               <a:solidFill>
@@ -4114,19 +4060,247 @@
               </a:solidFill>
             </a:endParaRPr>
           </a:p>
-          <a:p>
-            <a:pPr algn="just"/>
-            <a:r>
-              <a:rPr lang="en-US" altLang="zh-CN" sz="800" dirty="0">
+        </p:txBody>
+      </p:sp>
+      <p:pic>
+        <p:nvPicPr>
+          <p:cNvPr id="11" name="Picture 10" descr="A screenshot of a graph&#10;&#10;Description automatically generated">
+            <a:extLst>
+              <a:ext uri="{FF2B5EF4-FFF2-40B4-BE49-F238E27FC236}">
+                <a16:creationId xmlns:a16="http://schemas.microsoft.com/office/drawing/2014/main" id="{99905330-6AED-A438-0C20-F90FC815707F}"/>
+              </a:ext>
+            </a:extLst>
+          </p:cNvPr>
+          <p:cNvPicPr>
+            <a:picLocks noChangeAspect="1"/>
+          </p:cNvPicPr>
+          <p:nvPr/>
+        </p:nvPicPr>
+        <p:blipFill>
+          <a:blip r:embed="rId6" cstate="print">
+            <a:extLst>
+              <a:ext uri="{28A0092B-C50C-407E-A947-70E740481C1C}">
+                <a14:useLocalDpi xmlns:a14="http://schemas.microsoft.com/office/drawing/2010/main" val="0"/>
+              </a:ext>
+            </a:extLst>
+          </a:blip>
+          <a:stretch>
+            <a:fillRect/>
+          </a:stretch>
+        </p:blipFill>
+        <p:spPr>
+          <a:xfrm>
+            <a:off x="3794339" y="1981200"/>
+            <a:ext cx="2622125" cy="1958296"/>
+          </a:xfrm>
+          <a:prstGeom prst="rect">
+            <a:avLst/>
+          </a:prstGeom>
+          <a:ln>
+            <a:noFill/>
+          </a:ln>
+          <a:effectLst>
+            <a:outerShdw blurRad="292100" dist="139700" dir="2700000" algn="tl" rotWithShape="0">
+              <a:srgbClr val="333333">
+                <a:alpha val="65000"/>
+              </a:srgbClr>
+            </a:outerShdw>
+          </a:effectLst>
+        </p:spPr>
+      </p:pic>
+      <p:pic>
+        <p:nvPicPr>
+          <p:cNvPr id="15" name="Picture 14" descr="A chart with numbers and a blue and yellow background&#10;&#10;Description automatically generated with medium confidence">
+            <a:extLst>
+              <a:ext uri="{FF2B5EF4-FFF2-40B4-BE49-F238E27FC236}">
+                <a16:creationId xmlns:a16="http://schemas.microsoft.com/office/drawing/2014/main" id="{EDB2F922-B8BC-205C-D413-BAA4337BB58B}"/>
+              </a:ext>
+            </a:extLst>
+          </p:cNvPr>
+          <p:cNvPicPr>
+            <a:picLocks noChangeAspect="1"/>
+          </p:cNvPicPr>
+          <p:nvPr/>
+        </p:nvPicPr>
+        <p:blipFill>
+          <a:blip r:embed="rId7" cstate="print">
+            <a:extLst>
+              <a:ext uri="{28A0092B-C50C-407E-A947-70E740481C1C}">
+                <a14:useLocalDpi xmlns:a14="http://schemas.microsoft.com/office/drawing/2010/main" val="0"/>
+              </a:ext>
+            </a:extLst>
+          </a:blip>
+          <a:stretch>
+            <a:fillRect/>
+          </a:stretch>
+        </p:blipFill>
+        <p:spPr>
+          <a:xfrm>
+            <a:off x="3787987" y="4481440"/>
+            <a:ext cx="2810088" cy="2122279"/>
+          </a:xfrm>
+          <a:prstGeom prst="rect">
+            <a:avLst/>
+          </a:prstGeom>
+          <a:ln>
+            <a:noFill/>
+          </a:ln>
+          <a:effectLst>
+            <a:outerShdw blurRad="292100" dist="139700" dir="2700000" algn="tl" rotWithShape="0">
+              <a:srgbClr val="333333">
+                <a:alpha val="65000"/>
+              </a:srgbClr>
+            </a:outerShdw>
+          </a:effectLst>
+        </p:spPr>
+      </p:pic>
+      <p:sp>
+        <p:nvSpPr>
+          <p:cNvPr id="17" name="TextBox 16">
+            <a:extLst>
+              <a:ext uri="{FF2B5EF4-FFF2-40B4-BE49-F238E27FC236}">
+                <a16:creationId xmlns:a16="http://schemas.microsoft.com/office/drawing/2014/main" id="{7E5C0E9C-FCD5-B210-3EA2-1B08310B26DA}"/>
+              </a:ext>
+            </a:extLst>
+          </p:cNvPr>
+          <p:cNvSpPr txBox="1"/>
+          <p:nvPr/>
+        </p:nvSpPr>
+        <p:spPr>
+          <a:xfrm>
+            <a:off x="3274828" y="1585153"/>
+            <a:ext cx="2667000" cy="369332"/>
+          </a:xfrm>
+          <a:prstGeom prst="rect">
+            <a:avLst/>
+          </a:prstGeom>
+          <a:noFill/>
+        </p:spPr>
+        <p:txBody>
+          <a:bodyPr wrap="square" rtlCol="0">
+            <a:spAutoFit/>
+          </a:bodyPr>
+          <a:lstStyle/>
+          <a:p>
+            <a:r>
+              <a:rPr lang="en-US" altLang="zh-CN" b="1" dirty="0"/>
+              <a:t>Logistic Regression Model</a:t>
+            </a:r>
+            <a:endParaRPr lang="zh-CN" altLang="en-US" b="1" dirty="0"/>
+          </a:p>
+        </p:txBody>
+      </p:sp>
+      <p:sp>
+        <p:nvSpPr>
+          <p:cNvPr id="19" name="TextBox 18">
+            <a:extLst>
+              <a:ext uri="{FF2B5EF4-FFF2-40B4-BE49-F238E27FC236}">
+                <a16:creationId xmlns:a16="http://schemas.microsoft.com/office/drawing/2014/main" id="{D405FD3B-E4BB-221E-78B4-2DB41EA33CDD}"/>
+              </a:ext>
+            </a:extLst>
+          </p:cNvPr>
+          <p:cNvSpPr txBox="1"/>
+          <p:nvPr/>
+        </p:nvSpPr>
+        <p:spPr>
+          <a:xfrm>
+            <a:off x="3352801" y="3994089"/>
+            <a:ext cx="2667000" cy="369332"/>
+          </a:xfrm>
+          <a:prstGeom prst="rect">
+            <a:avLst/>
+          </a:prstGeom>
+          <a:noFill/>
+        </p:spPr>
+        <p:txBody>
+          <a:bodyPr wrap="square" rtlCol="0">
+            <a:spAutoFit/>
+          </a:bodyPr>
+          <a:lstStyle/>
+          <a:p>
+            <a:r>
+              <a:rPr lang="en-US" altLang="zh-CN" b="1" dirty="0"/>
+              <a:t>Main Model</a:t>
+            </a:r>
+            <a:endParaRPr lang="zh-CN" altLang="en-US" b="1" dirty="0"/>
+          </a:p>
+        </p:txBody>
+      </p:sp>
+      <p:sp>
+        <p:nvSpPr>
+          <p:cNvPr id="20" name="TextBox 19">
+            <a:extLst>
+              <a:ext uri="{FF2B5EF4-FFF2-40B4-BE49-F238E27FC236}">
+                <a16:creationId xmlns:a16="http://schemas.microsoft.com/office/drawing/2014/main" id="{0144AA10-5251-F992-9F39-4BE05B5E8E72}"/>
+              </a:ext>
+            </a:extLst>
+          </p:cNvPr>
+          <p:cNvSpPr txBox="1"/>
+          <p:nvPr/>
+        </p:nvSpPr>
+        <p:spPr>
+          <a:xfrm>
+            <a:off x="5414434" y="6958131"/>
+            <a:ext cx="1443566" cy="707886"/>
+          </a:xfrm>
+          <a:prstGeom prst="rect">
+            <a:avLst/>
+          </a:prstGeom>
+          <a:solidFill>
+            <a:schemeClr val="bg1">
+              <a:alpha val="40000"/>
+            </a:schemeClr>
+          </a:solidFill>
+        </p:spPr>
+        <p:txBody>
+          <a:bodyPr wrap="square" rtlCol="0">
+            <a:spAutoFit/>
+          </a:bodyPr>
+          <a:lstStyle/>
+          <a:p>
+            <a:r>
+              <a:rPr lang="en-US" altLang="zh-CN" sz="1000" dirty="0">
                 <a:solidFill>
                   <a:schemeClr val="tx2">
                     <a:lumMod val="50000"/>
                   </a:schemeClr>
                 </a:solidFill>
               </a:rPr>
-              <a:t>Pearson correlation analysis</a:t>
-            </a:r>
-            <a:endParaRPr lang="zh-CN" altLang="zh-CN" sz="800" dirty="0">
+              <a:t>More information can be found on </a:t>
+            </a:r>
+            <a:r>
+              <a:rPr lang="en-US" altLang="zh-CN" sz="1000" dirty="0" err="1">
+                <a:solidFill>
+                  <a:schemeClr val="tx2">
+                    <a:lumMod val="50000"/>
+                  </a:schemeClr>
+                </a:solidFill>
+              </a:rPr>
+              <a:t>Github</a:t>
+            </a:r>
+            <a:r>
+              <a:rPr lang="en-US" altLang="zh-CN" sz="1000" dirty="0">
+                <a:solidFill>
+                  <a:schemeClr val="tx2">
+                    <a:lumMod val="50000"/>
+                  </a:schemeClr>
+                </a:solidFill>
+              </a:rPr>
+              <a:t> </a:t>
+            </a:r>
+          </a:p>
+          <a:p>
+            <a:r>
+              <a:rPr lang="en-US" altLang="zh-CN" sz="1000" u="sng" dirty="0">
+                <a:solidFill>
+                  <a:schemeClr val="tx2">
+                    <a:lumMod val="50000"/>
+                  </a:schemeClr>
+                </a:solidFill>
+              </a:rPr>
+              <a:t>https://github.com/dashen2004/NUS_Group3</a:t>
+            </a:r>
+            <a:endParaRPr lang="zh-CN" altLang="en-US" sz="1000" u="sng" dirty="0">
               <a:solidFill>
                 <a:schemeClr val="tx2">
                   <a:lumMod val="50000"/>

</xml_diff>

<commit_message>
The latest version of poster which may send to acnvas
</commit_message>
<xml_diff>
--- a/docs/myPoster.pptx
+++ b/docs/myPoster.pptx
@@ -4,6 +4,9 @@
   <p:sldMasterIdLst>
     <p:sldMasterId id="2147483648" r:id="rId1"/>
   </p:sldMasterIdLst>
+  <p:notesMasterIdLst>
+    <p:notesMasterId r:id="rId3"/>
+  </p:notesMasterIdLst>
   <p:sldIdLst>
     <p:sldId id="256" r:id="rId2"/>
   </p:sldIdLst>
@@ -123,6 +126,440 @@
 </p:presentation>
 </file>
 
+<file path=ppt/notesMasters/notesMaster1.xml><?xml version="1.0" encoding="utf-8"?>
+<p:notesMaster xmlns:a="http://schemas.openxmlformats.org/drawingml/2006/main" xmlns:r="http://schemas.openxmlformats.org/officeDocument/2006/relationships" xmlns:p="http://schemas.openxmlformats.org/presentationml/2006/main">
+  <p:cSld>
+    <p:bg>
+      <p:bgRef idx="1001">
+        <a:schemeClr val="bg1"/>
+      </p:bgRef>
+    </p:bg>
+    <p:spTree>
+      <p:nvGrpSpPr>
+        <p:cNvPr id="1" name=""/>
+        <p:cNvGrpSpPr/>
+        <p:nvPr/>
+      </p:nvGrpSpPr>
+      <p:grpSpPr>
+        <a:xfrm>
+          <a:off x="0" y="0"/>
+          <a:ext cx="0" cy="0"/>
+          <a:chOff x="0" y="0"/>
+          <a:chExt cx="0" cy="0"/>
+        </a:xfrm>
+      </p:grpSpPr>
+      <p:sp>
+        <p:nvSpPr>
+          <p:cNvPr id="2" name="Header Placeholder 1"/>
+          <p:cNvSpPr>
+            <a:spLocks noGrp="1"/>
+          </p:cNvSpPr>
+          <p:nvPr>
+            <p:ph type="hdr" sz="quarter"/>
+          </p:nvPr>
+        </p:nvSpPr>
+        <p:spPr>
+          <a:xfrm>
+            <a:off x="0" y="0"/>
+            <a:ext cx="2971800" cy="458788"/>
+          </a:xfrm>
+          <a:prstGeom prst="rect">
+            <a:avLst/>
+          </a:prstGeom>
+        </p:spPr>
+        <p:txBody>
+          <a:bodyPr vert="horz" lIns="91440" tIns="45720" rIns="91440" bIns="45720" rtlCol="0"/>
+          <a:lstStyle>
+            <a:lvl1pPr algn="l">
+              <a:defRPr sz="1200"/>
+            </a:lvl1pPr>
+          </a:lstStyle>
+          <a:p>
+            <a:endParaRPr lang="zh-CN" altLang="en-US"/>
+          </a:p>
+        </p:txBody>
+      </p:sp>
+      <p:sp>
+        <p:nvSpPr>
+          <p:cNvPr id="3" name="Date Placeholder 2"/>
+          <p:cNvSpPr>
+            <a:spLocks noGrp="1"/>
+          </p:cNvSpPr>
+          <p:nvPr>
+            <p:ph type="dt" idx="1"/>
+          </p:nvPr>
+        </p:nvSpPr>
+        <p:spPr>
+          <a:xfrm>
+            <a:off x="3884613" y="0"/>
+            <a:ext cx="2971800" cy="458788"/>
+          </a:xfrm>
+          <a:prstGeom prst="rect">
+            <a:avLst/>
+          </a:prstGeom>
+        </p:spPr>
+        <p:txBody>
+          <a:bodyPr vert="horz" lIns="91440" tIns="45720" rIns="91440" bIns="45720" rtlCol="0"/>
+          <a:lstStyle>
+            <a:lvl1pPr algn="r">
+              <a:defRPr sz="1200"/>
+            </a:lvl1pPr>
+          </a:lstStyle>
+          <a:p>
+            <a:fld id="{A8821B37-7461-41B8-9A09-E39770628C59}" type="datetimeFigureOut">
+              <a:rPr lang="zh-CN" altLang="en-US" smtClean="0"/>
+              <a:t>2024/7/17</a:t>
+            </a:fld>
+            <a:endParaRPr lang="zh-CN" altLang="en-US"/>
+          </a:p>
+        </p:txBody>
+      </p:sp>
+      <p:sp>
+        <p:nvSpPr>
+          <p:cNvPr id="4" name="Slide Image Placeholder 3"/>
+          <p:cNvSpPr>
+            <a:spLocks noGrp="1" noRot="1" noChangeAspect="1"/>
+          </p:cNvSpPr>
+          <p:nvPr>
+            <p:ph type="sldImg" idx="2"/>
+          </p:nvPr>
+        </p:nvSpPr>
+        <p:spPr>
+          <a:xfrm>
+            <a:off x="2360613" y="1143000"/>
+            <a:ext cx="2136775" cy="3086100"/>
+          </a:xfrm>
+          <a:prstGeom prst="rect">
+            <a:avLst/>
+          </a:prstGeom>
+          <a:noFill/>
+          <a:ln w="12700">
+            <a:solidFill>
+              <a:prstClr val="black"/>
+            </a:solidFill>
+          </a:ln>
+        </p:spPr>
+        <p:txBody>
+          <a:bodyPr vert="horz" lIns="91440" tIns="45720" rIns="91440" bIns="45720" rtlCol="0" anchor="ctr"/>
+          <a:lstStyle/>
+          <a:p>
+            <a:endParaRPr lang="zh-CN" altLang="en-US"/>
+          </a:p>
+        </p:txBody>
+      </p:sp>
+      <p:sp>
+        <p:nvSpPr>
+          <p:cNvPr id="5" name="Notes Placeholder 4"/>
+          <p:cNvSpPr>
+            <a:spLocks noGrp="1"/>
+          </p:cNvSpPr>
+          <p:nvPr>
+            <p:ph type="body" sz="quarter" idx="3"/>
+          </p:nvPr>
+        </p:nvSpPr>
+        <p:spPr>
+          <a:xfrm>
+            <a:off x="685800" y="4400550"/>
+            <a:ext cx="5486400" cy="3600450"/>
+          </a:xfrm>
+          <a:prstGeom prst="rect">
+            <a:avLst/>
+          </a:prstGeom>
+        </p:spPr>
+        <p:txBody>
+          <a:bodyPr vert="horz" lIns="91440" tIns="45720" rIns="91440" bIns="45720" rtlCol="0"/>
+          <a:lstStyle/>
+          <a:p>
+            <a:pPr lvl="0"/>
+            <a:r>
+              <a:rPr lang="en-GB" altLang="zh-CN"/>
+              <a:t>Click to edit Master text styles</a:t>
+            </a:r>
+          </a:p>
+          <a:p>
+            <a:pPr lvl="1"/>
+            <a:r>
+              <a:rPr lang="en-GB" altLang="zh-CN"/>
+              <a:t>Second level</a:t>
+            </a:r>
+          </a:p>
+          <a:p>
+            <a:pPr lvl="2"/>
+            <a:r>
+              <a:rPr lang="en-GB" altLang="zh-CN"/>
+              <a:t>Third level</a:t>
+            </a:r>
+          </a:p>
+          <a:p>
+            <a:pPr lvl="3"/>
+            <a:r>
+              <a:rPr lang="en-GB" altLang="zh-CN"/>
+              <a:t>Fourth level</a:t>
+            </a:r>
+          </a:p>
+          <a:p>
+            <a:pPr lvl="4"/>
+            <a:r>
+              <a:rPr lang="en-GB" altLang="zh-CN"/>
+              <a:t>Fifth level</a:t>
+            </a:r>
+            <a:endParaRPr lang="zh-CN" altLang="en-US"/>
+          </a:p>
+        </p:txBody>
+      </p:sp>
+      <p:sp>
+        <p:nvSpPr>
+          <p:cNvPr id="6" name="Footer Placeholder 5"/>
+          <p:cNvSpPr>
+            <a:spLocks noGrp="1"/>
+          </p:cNvSpPr>
+          <p:nvPr>
+            <p:ph type="ftr" sz="quarter" idx="4"/>
+          </p:nvPr>
+        </p:nvSpPr>
+        <p:spPr>
+          <a:xfrm>
+            <a:off x="0" y="8685213"/>
+            <a:ext cx="2971800" cy="458787"/>
+          </a:xfrm>
+          <a:prstGeom prst="rect">
+            <a:avLst/>
+          </a:prstGeom>
+        </p:spPr>
+        <p:txBody>
+          <a:bodyPr vert="horz" lIns="91440" tIns="45720" rIns="91440" bIns="45720" rtlCol="0" anchor="b"/>
+          <a:lstStyle>
+            <a:lvl1pPr algn="l">
+              <a:defRPr sz="1200"/>
+            </a:lvl1pPr>
+          </a:lstStyle>
+          <a:p>
+            <a:endParaRPr lang="zh-CN" altLang="en-US"/>
+          </a:p>
+        </p:txBody>
+      </p:sp>
+      <p:sp>
+        <p:nvSpPr>
+          <p:cNvPr id="7" name="Slide Number Placeholder 6"/>
+          <p:cNvSpPr>
+            <a:spLocks noGrp="1"/>
+          </p:cNvSpPr>
+          <p:nvPr>
+            <p:ph type="sldNum" sz="quarter" idx="5"/>
+          </p:nvPr>
+        </p:nvSpPr>
+        <p:spPr>
+          <a:xfrm>
+            <a:off x="3884613" y="8685213"/>
+            <a:ext cx="2971800" cy="458787"/>
+          </a:xfrm>
+          <a:prstGeom prst="rect">
+            <a:avLst/>
+          </a:prstGeom>
+        </p:spPr>
+        <p:txBody>
+          <a:bodyPr vert="horz" lIns="91440" tIns="45720" rIns="91440" bIns="45720" rtlCol="0" anchor="b"/>
+          <a:lstStyle>
+            <a:lvl1pPr algn="r">
+              <a:defRPr sz="1200"/>
+            </a:lvl1pPr>
+          </a:lstStyle>
+          <a:p>
+            <a:fld id="{AEAA7EFE-0118-4CBA-96B1-67A7F4944D71}" type="slidenum">
+              <a:rPr lang="zh-CN" altLang="en-US" smtClean="0"/>
+              <a:t>‹#›</a:t>
+            </a:fld>
+            <a:endParaRPr lang="zh-CN" altLang="en-US"/>
+          </a:p>
+        </p:txBody>
+      </p:sp>
+    </p:spTree>
+    <p:extLst>
+      <p:ext uri="{BB962C8B-B14F-4D97-AF65-F5344CB8AC3E}">
+        <p14:creationId xmlns:p14="http://schemas.microsoft.com/office/powerpoint/2010/main" val="188786317"/>
+      </p:ext>
+    </p:extLst>
+  </p:cSld>
+  <p:clrMap bg1="lt1" tx1="dk1" bg2="lt2" tx2="dk2" accent1="accent1" accent2="accent2" accent3="accent3" accent4="accent4" accent5="accent5" accent6="accent6" hlink="hlink" folHlink="folHlink"/>
+  <p:notesStyle>
+    <a:lvl1pPr marL="0" algn="l" defTabSz="914400" rtl="0" eaLnBrk="1" latinLnBrk="0" hangingPunct="1">
+      <a:defRPr sz="1200" kern="1200">
+        <a:solidFill>
+          <a:schemeClr val="tx1"/>
+        </a:solidFill>
+        <a:latin typeface="+mn-lt"/>
+        <a:ea typeface="+mn-ea"/>
+        <a:cs typeface="+mn-cs"/>
+      </a:defRPr>
+    </a:lvl1pPr>
+    <a:lvl2pPr marL="457200" algn="l" defTabSz="914400" rtl="0" eaLnBrk="1" latinLnBrk="0" hangingPunct="1">
+      <a:defRPr sz="1200" kern="1200">
+        <a:solidFill>
+          <a:schemeClr val="tx1"/>
+        </a:solidFill>
+        <a:latin typeface="+mn-lt"/>
+        <a:ea typeface="+mn-ea"/>
+        <a:cs typeface="+mn-cs"/>
+      </a:defRPr>
+    </a:lvl2pPr>
+    <a:lvl3pPr marL="914400" algn="l" defTabSz="914400" rtl="0" eaLnBrk="1" latinLnBrk="0" hangingPunct="1">
+      <a:defRPr sz="1200" kern="1200">
+        <a:solidFill>
+          <a:schemeClr val="tx1"/>
+        </a:solidFill>
+        <a:latin typeface="+mn-lt"/>
+        <a:ea typeface="+mn-ea"/>
+        <a:cs typeface="+mn-cs"/>
+      </a:defRPr>
+    </a:lvl3pPr>
+    <a:lvl4pPr marL="1371600" algn="l" defTabSz="914400" rtl="0" eaLnBrk="1" latinLnBrk="0" hangingPunct="1">
+      <a:defRPr sz="1200" kern="1200">
+        <a:solidFill>
+          <a:schemeClr val="tx1"/>
+        </a:solidFill>
+        <a:latin typeface="+mn-lt"/>
+        <a:ea typeface="+mn-ea"/>
+        <a:cs typeface="+mn-cs"/>
+      </a:defRPr>
+    </a:lvl4pPr>
+    <a:lvl5pPr marL="1828800" algn="l" defTabSz="914400" rtl="0" eaLnBrk="1" latinLnBrk="0" hangingPunct="1">
+      <a:defRPr sz="1200" kern="1200">
+        <a:solidFill>
+          <a:schemeClr val="tx1"/>
+        </a:solidFill>
+        <a:latin typeface="+mn-lt"/>
+        <a:ea typeface="+mn-ea"/>
+        <a:cs typeface="+mn-cs"/>
+      </a:defRPr>
+    </a:lvl5pPr>
+    <a:lvl6pPr marL="2286000" algn="l" defTabSz="914400" rtl="0" eaLnBrk="1" latinLnBrk="0" hangingPunct="1">
+      <a:defRPr sz="1200" kern="1200">
+        <a:solidFill>
+          <a:schemeClr val="tx1"/>
+        </a:solidFill>
+        <a:latin typeface="+mn-lt"/>
+        <a:ea typeface="+mn-ea"/>
+        <a:cs typeface="+mn-cs"/>
+      </a:defRPr>
+    </a:lvl6pPr>
+    <a:lvl7pPr marL="2743200" algn="l" defTabSz="914400" rtl="0" eaLnBrk="1" latinLnBrk="0" hangingPunct="1">
+      <a:defRPr sz="1200" kern="1200">
+        <a:solidFill>
+          <a:schemeClr val="tx1"/>
+        </a:solidFill>
+        <a:latin typeface="+mn-lt"/>
+        <a:ea typeface="+mn-ea"/>
+        <a:cs typeface="+mn-cs"/>
+      </a:defRPr>
+    </a:lvl7pPr>
+    <a:lvl8pPr marL="3200400" algn="l" defTabSz="914400" rtl="0" eaLnBrk="1" latinLnBrk="0" hangingPunct="1">
+      <a:defRPr sz="1200" kern="1200">
+        <a:solidFill>
+          <a:schemeClr val="tx1"/>
+        </a:solidFill>
+        <a:latin typeface="+mn-lt"/>
+        <a:ea typeface="+mn-ea"/>
+        <a:cs typeface="+mn-cs"/>
+      </a:defRPr>
+    </a:lvl8pPr>
+    <a:lvl9pPr marL="3657600" algn="l" defTabSz="914400" rtl="0" eaLnBrk="1" latinLnBrk="0" hangingPunct="1">
+      <a:defRPr sz="1200" kern="1200">
+        <a:solidFill>
+          <a:schemeClr val="tx1"/>
+        </a:solidFill>
+        <a:latin typeface="+mn-lt"/>
+        <a:ea typeface="+mn-ea"/>
+        <a:cs typeface="+mn-cs"/>
+      </a:defRPr>
+    </a:lvl9pPr>
+  </p:notesStyle>
+</p:notesMaster>
+</file>
+
+<file path=ppt/notesSlides/notesSlide1.xml><?xml version="1.0" encoding="utf-8"?>
+<p:notes xmlns:a="http://schemas.openxmlformats.org/drawingml/2006/main" xmlns:r="http://schemas.openxmlformats.org/officeDocument/2006/relationships" xmlns:p="http://schemas.openxmlformats.org/presentationml/2006/main">
+  <p:cSld>
+    <p:spTree>
+      <p:nvGrpSpPr>
+        <p:cNvPr id="1" name=""/>
+        <p:cNvGrpSpPr/>
+        <p:nvPr/>
+      </p:nvGrpSpPr>
+      <p:grpSpPr>
+        <a:xfrm>
+          <a:off x="0" y="0"/>
+          <a:ext cx="0" cy="0"/>
+          <a:chOff x="0" y="0"/>
+          <a:chExt cx="0" cy="0"/>
+        </a:xfrm>
+      </p:grpSpPr>
+      <p:sp>
+        <p:nvSpPr>
+          <p:cNvPr id="2" name="Slide Image Placeholder 1"/>
+          <p:cNvSpPr>
+            <a:spLocks noGrp="1" noRot="1" noChangeAspect="1"/>
+          </p:cNvSpPr>
+          <p:nvPr>
+            <p:ph type="sldImg"/>
+          </p:nvPr>
+        </p:nvSpPr>
+        <p:spPr/>
+      </p:sp>
+      <p:sp>
+        <p:nvSpPr>
+          <p:cNvPr id="3" name="Notes Placeholder 2"/>
+          <p:cNvSpPr>
+            <a:spLocks noGrp="1"/>
+          </p:cNvSpPr>
+          <p:nvPr>
+            <p:ph type="body" idx="1"/>
+          </p:nvPr>
+        </p:nvSpPr>
+        <p:spPr/>
+        <p:txBody>
+          <a:bodyPr/>
+          <a:lstStyle/>
+          <a:p>
+            <a:endParaRPr lang="zh-CN" altLang="en-US" dirty="0"/>
+          </a:p>
+        </p:txBody>
+      </p:sp>
+      <p:sp>
+        <p:nvSpPr>
+          <p:cNvPr id="4" name="Slide Number Placeholder 3"/>
+          <p:cNvSpPr>
+            <a:spLocks noGrp="1"/>
+          </p:cNvSpPr>
+          <p:nvPr>
+            <p:ph type="sldNum" sz="quarter" idx="5"/>
+          </p:nvPr>
+        </p:nvSpPr>
+        <p:spPr/>
+        <p:txBody>
+          <a:bodyPr/>
+          <a:lstStyle/>
+          <a:p>
+            <a:fld id="{AEAA7EFE-0118-4CBA-96B1-67A7F4944D71}" type="slidenum">
+              <a:rPr lang="zh-CN" altLang="en-US" smtClean="0"/>
+              <a:t>1</a:t>
+            </a:fld>
+            <a:endParaRPr lang="zh-CN" altLang="en-US"/>
+          </a:p>
+        </p:txBody>
+      </p:sp>
+    </p:spTree>
+    <p:extLst>
+      <p:ext uri="{BB962C8B-B14F-4D97-AF65-F5344CB8AC3E}">
+        <p14:creationId xmlns:p14="http://schemas.microsoft.com/office/powerpoint/2010/main" val="2839028341"/>
+      </p:ext>
+    </p:extLst>
+  </p:cSld>
+  <p:clrMapOvr>
+    <a:masterClrMapping/>
+  </p:clrMapOvr>
+</p:notes>
+</file>
+
 <file path=ppt/slideLayouts/slideLayout1.xml><?xml version="1.0" encoding="utf-8"?>
 <p:sldLayout xmlns:a="http://schemas.openxmlformats.org/drawingml/2006/main" xmlns:r="http://schemas.openxmlformats.org/officeDocument/2006/relationships" xmlns:p="http://schemas.openxmlformats.org/presentationml/2006/main" type="title" preserve="1">
   <p:cSld name="Title Slide">
@@ -302,7 +739,7 @@
           <a:p>
             <a:fld id="{FB2106FF-3511-46BC-A318-6C9642C43246}" type="datetimeFigureOut">
               <a:rPr lang="en-US" smtClean="0"/>
-              <a:t>7/16/2024</a:t>
+              <a:t>7/17/2024</a:t>
             </a:fld>
             <a:endParaRPr lang="en-US"/>
           </a:p>
@@ -465,7 +902,7 @@
           <a:p>
             <a:fld id="{FB2106FF-3511-46BC-A318-6C9642C43246}" type="datetimeFigureOut">
               <a:rPr lang="en-US" smtClean="0"/>
-              <a:t>7/16/2024</a:t>
+              <a:t>7/17/2024</a:t>
             </a:fld>
             <a:endParaRPr lang="en-US"/>
           </a:p>
@@ -638,7 +1075,7 @@
           <a:p>
             <a:fld id="{FB2106FF-3511-46BC-A318-6C9642C43246}" type="datetimeFigureOut">
               <a:rPr lang="en-US" smtClean="0"/>
-              <a:t>7/16/2024</a:t>
+              <a:t>7/17/2024</a:t>
             </a:fld>
             <a:endParaRPr lang="en-US"/>
           </a:p>
@@ -801,7 +1238,7 @@
           <a:p>
             <a:fld id="{FB2106FF-3511-46BC-A318-6C9642C43246}" type="datetimeFigureOut">
               <a:rPr lang="en-US" smtClean="0"/>
-              <a:t>7/16/2024</a:t>
+              <a:t>7/17/2024</a:t>
             </a:fld>
             <a:endParaRPr lang="en-US"/>
           </a:p>
@@ -1041,7 +1478,7 @@
           <a:p>
             <a:fld id="{FB2106FF-3511-46BC-A318-6C9642C43246}" type="datetimeFigureOut">
               <a:rPr lang="en-US" smtClean="0"/>
-              <a:t>7/16/2024</a:t>
+              <a:t>7/17/2024</a:t>
             </a:fld>
             <a:endParaRPr lang="en-US"/>
           </a:p>
@@ -1321,7 +1758,7 @@
           <a:p>
             <a:fld id="{FB2106FF-3511-46BC-A318-6C9642C43246}" type="datetimeFigureOut">
               <a:rPr lang="en-US" smtClean="0"/>
-              <a:t>7/16/2024</a:t>
+              <a:t>7/17/2024</a:t>
             </a:fld>
             <a:endParaRPr lang="en-US"/>
           </a:p>
@@ -1740,7 +2177,7 @@
           <a:p>
             <a:fld id="{FB2106FF-3511-46BC-A318-6C9642C43246}" type="datetimeFigureOut">
               <a:rPr lang="en-US" smtClean="0"/>
-              <a:t>7/16/2024</a:t>
+              <a:t>7/17/2024</a:t>
             </a:fld>
             <a:endParaRPr lang="en-US"/>
           </a:p>
@@ -1852,7 +2289,7 @@
           <a:p>
             <a:fld id="{FB2106FF-3511-46BC-A318-6C9642C43246}" type="datetimeFigureOut">
               <a:rPr lang="en-US" smtClean="0"/>
-              <a:t>7/16/2024</a:t>
+              <a:t>7/17/2024</a:t>
             </a:fld>
             <a:endParaRPr lang="en-US"/>
           </a:p>
@@ -1942,7 +2379,7 @@
           <a:p>
             <a:fld id="{FB2106FF-3511-46BC-A318-6C9642C43246}" type="datetimeFigureOut">
               <a:rPr lang="en-US" smtClean="0"/>
-              <a:t>7/16/2024</a:t>
+              <a:t>7/17/2024</a:t>
             </a:fld>
             <a:endParaRPr lang="en-US"/>
           </a:p>
@@ -2212,7 +2649,7 @@
           <a:p>
             <a:fld id="{FB2106FF-3511-46BC-A318-6C9642C43246}" type="datetimeFigureOut">
               <a:rPr lang="en-US" smtClean="0"/>
-              <a:t>7/16/2024</a:t>
+              <a:t>7/17/2024</a:t>
             </a:fld>
             <a:endParaRPr lang="en-US"/>
           </a:p>
@@ -2459,7 +2896,7 @@
           <a:p>
             <a:fld id="{FB2106FF-3511-46BC-A318-6C9642C43246}" type="datetimeFigureOut">
               <a:rPr lang="en-US" smtClean="0"/>
-              <a:t>7/16/2024</a:t>
+              <a:t>7/17/2024</a:t>
             </a:fld>
             <a:endParaRPr lang="en-US"/>
           </a:p>
@@ -2665,7 +3102,7 @@
           <a:p>
             <a:fld id="{FB2106FF-3511-46BC-A318-6C9642C43246}" type="datetimeFigureOut">
               <a:rPr lang="en-US" smtClean="0"/>
-              <a:t>7/16/2024</a:t>
+              <a:t>7/17/2024</a:t>
             </a:fld>
             <a:endParaRPr lang="en-US"/>
           </a:p>
@@ -3035,152 +3472,6 @@
           <a:chExt cx="0" cy="0"/>
         </a:xfrm>
       </p:grpSpPr>
-      <p:sp>
-        <p:nvSpPr>
-          <p:cNvPr id="2" name="Rectangle 1">
-            <a:extLst>
-              <a:ext uri="{FF2B5EF4-FFF2-40B4-BE49-F238E27FC236}">
-                <a16:creationId xmlns:a16="http://schemas.microsoft.com/office/drawing/2014/main" id="{67581FE2-939B-F7C0-6AAF-6418EC301A6D}"/>
-              </a:ext>
-            </a:extLst>
-          </p:cNvPr>
-          <p:cNvSpPr/>
-          <p:nvPr/>
-        </p:nvSpPr>
-        <p:spPr>
-          <a:xfrm>
-            <a:off x="0" y="9128760"/>
-            <a:ext cx="6858000" cy="777240"/>
-          </a:xfrm>
-          <a:prstGeom prst="rect">
-            <a:avLst/>
-          </a:prstGeom>
-          <a:solidFill>
-            <a:srgbClr val="F68B1F"/>
-          </a:solidFill>
-          <a:ln>
-            <a:noFill/>
-          </a:ln>
-        </p:spPr>
-        <p:style>
-          <a:lnRef idx="2">
-            <a:schemeClr val="accent1">
-              <a:shade val="50000"/>
-            </a:schemeClr>
-          </a:lnRef>
-          <a:fillRef idx="1">
-            <a:schemeClr val="accent1"/>
-          </a:fillRef>
-          <a:effectRef idx="0">
-            <a:schemeClr val="accent1"/>
-          </a:effectRef>
-          <a:fontRef idx="minor">
-            <a:schemeClr val="lt1"/>
-          </a:fontRef>
-        </p:style>
-        <p:txBody>
-          <a:bodyPr rtlCol="0" anchor="ctr"/>
-          <a:lstStyle/>
-          <a:p>
-            <a:pPr algn="ctr"/>
-            <a:endParaRPr lang="en-US"/>
-          </a:p>
-        </p:txBody>
-      </p:sp>
-      <p:sp>
-        <p:nvSpPr>
-          <p:cNvPr id="3" name="TextBox 2">
-            <a:extLst>
-              <a:ext uri="{FF2B5EF4-FFF2-40B4-BE49-F238E27FC236}">
-                <a16:creationId xmlns:a16="http://schemas.microsoft.com/office/drawing/2014/main" id="{D3E183E0-6D24-8B7E-2A5C-3EE064106518}"/>
-              </a:ext>
-            </a:extLst>
-          </p:cNvPr>
-          <p:cNvSpPr txBox="1"/>
-          <p:nvPr/>
-        </p:nvSpPr>
-        <p:spPr>
-          <a:xfrm>
-            <a:off x="152400" y="9371186"/>
-            <a:ext cx="3962400" cy="292388"/>
-          </a:xfrm>
-          <a:prstGeom prst="rect">
-            <a:avLst/>
-          </a:prstGeom>
-          <a:noFill/>
-        </p:spPr>
-        <p:txBody>
-          <a:bodyPr wrap="square" rtlCol="0">
-            <a:spAutoFit/>
-          </a:bodyPr>
-          <a:lstStyle/>
-          <a:p>
-            <a:r>
-              <a:rPr lang="en-US" sz="1280" b="1" dirty="0">
-                <a:solidFill>
-                  <a:schemeClr val="bg1"/>
-                </a:solidFill>
-                <a:latin typeface="Verdana" panose="020B0604030504040204" pitchFamily="34" charset="0"/>
-                <a:ea typeface="Verdana" panose="020B0604030504040204" pitchFamily="34" charset="0"/>
-              </a:rPr>
-              <a:t>NUS SOC Summer </a:t>
-            </a:r>
-            <a:r>
-              <a:rPr lang="en-US" sz="1280" b="1">
-                <a:solidFill>
-                  <a:schemeClr val="bg1"/>
-                </a:solidFill>
-                <a:latin typeface="Verdana" panose="020B0604030504040204" pitchFamily="34" charset="0"/>
-                <a:ea typeface="Verdana" panose="020B0604030504040204" pitchFamily="34" charset="0"/>
-              </a:rPr>
-              <a:t>Workshop 2024</a:t>
-            </a:r>
-            <a:endParaRPr lang="en-US" sz="1280" b="1" dirty="0">
-              <a:solidFill>
-                <a:schemeClr val="bg1"/>
-              </a:solidFill>
-              <a:latin typeface="Verdana" panose="020B0604030504040204" pitchFamily="34" charset="0"/>
-              <a:ea typeface="Verdana" panose="020B0604030504040204" pitchFamily="34" charset="0"/>
-            </a:endParaRPr>
-          </a:p>
-        </p:txBody>
-      </p:sp>
-      <p:pic>
-        <p:nvPicPr>
-          <p:cNvPr id="4" name="Picture 3" descr="A close-up of a logo&#10;&#10;Description automatically generated">
-            <a:extLst>
-              <a:ext uri="{FF2B5EF4-FFF2-40B4-BE49-F238E27FC236}">
-                <a16:creationId xmlns:a16="http://schemas.microsoft.com/office/drawing/2014/main" id="{9D9F0D89-AF42-4B94-F6CA-26B23249F383}"/>
-              </a:ext>
-            </a:extLst>
-          </p:cNvPr>
-          <p:cNvPicPr>
-            <a:picLocks noChangeAspect="1"/>
-          </p:cNvPicPr>
-          <p:nvPr/>
-        </p:nvPicPr>
-        <p:blipFill>
-          <a:blip r:embed="rId2" cstate="print">
-            <a:extLst>
-              <a:ext uri="{28A0092B-C50C-407E-A947-70E740481C1C}">
-                <a14:useLocalDpi xmlns:a14="http://schemas.microsoft.com/office/drawing/2010/main" val="0"/>
-              </a:ext>
-            </a:extLst>
-          </a:blip>
-          <a:stretch>
-            <a:fillRect/>
-          </a:stretch>
-        </p:blipFill>
-        <p:spPr>
-          <a:xfrm>
-            <a:off x="5025656" y="9255763"/>
-            <a:ext cx="1832344" cy="523234"/>
-          </a:xfrm>
-          <a:prstGeom prst="rect">
-            <a:avLst/>
-          </a:prstGeom>
-        </p:spPr>
-      </p:pic>
       <p:pic>
         <p:nvPicPr>
           <p:cNvPr id="6" name="Picture 5">
@@ -3225,7 +3516,7 @@
         </p:nvSpPr>
         <p:spPr>
           <a:xfrm>
-            <a:off x="8467" y="242426"/>
+            <a:off x="8467" y="196259"/>
             <a:ext cx="6942667" cy="1323439"/>
           </a:xfrm>
           <a:prstGeom prst="rect">
@@ -3378,15 +3669,15 @@
         </p:nvSpPr>
         <p:spPr>
           <a:xfrm>
-            <a:off x="5721776" y="7983781"/>
-            <a:ext cx="876299" cy="861774"/>
+            <a:off x="-77469" y="8704327"/>
+            <a:ext cx="1201273" cy="461665"/>
           </a:xfrm>
           <a:prstGeom prst="rect">
             <a:avLst/>
           </a:prstGeom>
           <a:solidFill>
             <a:schemeClr val="bg1">
-              <a:alpha val="40000"/>
+              <a:alpha val="70000"/>
             </a:schemeClr>
           </a:solidFill>
           <a:ln>
@@ -3400,7 +3691,7 @@
           <a:lstStyle/>
           <a:p>
             <a:r>
-              <a:rPr lang="en-US" altLang="zh-CN" sz="1000" dirty="0">
+              <a:rPr lang="en-US" altLang="zh-CN" sz="800" dirty="0">
                 <a:solidFill>
                   <a:schemeClr val="tx2">
                     <a:lumMod val="50000"/>
@@ -3412,7 +3703,7 @@
           </a:p>
           <a:p>
             <a:r>
-              <a:rPr lang="en-US" altLang="zh-CN" sz="1000" dirty="0" err="1">
+              <a:rPr lang="en-US" altLang="zh-CN" sz="800" dirty="0" err="1">
                 <a:solidFill>
                   <a:schemeClr val="tx2">
                     <a:lumMod val="50000"/>
@@ -3422,50 +3713,102 @@
               <a:t>Youyao</a:t>
             </a:r>
             <a:r>
-              <a:rPr lang="en-US" altLang="zh-CN" sz="1000" dirty="0">
+              <a:rPr lang="en-US" altLang="zh-CN" sz="800" dirty="0">
                 <a:solidFill>
                   <a:schemeClr val="tx2">
                     <a:lumMod val="50000"/>
                   </a:schemeClr>
                 </a:solidFill>
               </a:rPr>
-              <a:t> Gao</a:t>
-            </a:r>
-          </a:p>
-          <a:p>
-            <a:r>
-              <a:rPr lang="en-US" altLang="zh-CN" sz="1000" dirty="0">
+              <a:t> Gao, Yu Liang, </a:t>
+            </a:r>
+            <a:r>
+              <a:rPr lang="en-US" altLang="zh-CN" sz="800" dirty="0" err="1">
                 <a:solidFill>
                   <a:schemeClr val="tx2">
                     <a:lumMod val="50000"/>
                   </a:schemeClr>
                 </a:solidFill>
               </a:rPr>
-              <a:t>Yu Liang</a:t>
-            </a:r>
-          </a:p>
-          <a:p>
-            <a:r>
-              <a:rPr lang="en-US" altLang="zh-CN" sz="1000" dirty="0" err="1">
+              <a:t>Haosong</a:t>
+            </a:r>
+            <a:r>
+              <a:rPr lang="en-US" altLang="zh-CN" sz="800" dirty="0">
                 <a:solidFill>
                   <a:schemeClr val="tx2">
                     <a:lumMod val="50000"/>
                   </a:schemeClr>
                 </a:solidFill>
               </a:rPr>
-              <a:t>Haosong</a:t>
-            </a:r>
-            <a:r>
-              <a:rPr lang="en-US" altLang="zh-CN" sz="1000" dirty="0">
+              <a:t> Sun,</a:t>
+            </a:r>
+            <a:r>
+              <a:rPr lang="zh-CN" altLang="en-US" sz="800" dirty="0">
                 <a:solidFill>
                   <a:schemeClr val="tx2">
                     <a:lumMod val="50000"/>
                   </a:schemeClr>
                 </a:solidFill>
               </a:rPr>
-              <a:t> Sun</a:t>
-            </a:r>
-            <a:endParaRPr lang="zh-CN" altLang="en-US" sz="1000" dirty="0">
+              <a:t> </a:t>
+            </a:r>
+            <a:r>
+              <a:rPr lang="en-US" altLang="zh-CN" sz="800" dirty="0">
+                <a:solidFill>
+                  <a:schemeClr val="tx2">
+                    <a:lumMod val="50000"/>
+                  </a:schemeClr>
+                </a:solidFill>
+              </a:rPr>
+              <a:t>Xinyi Zeng</a:t>
+            </a:r>
+          </a:p>
+        </p:txBody>
+      </p:sp>
+      <p:sp>
+        <p:nvSpPr>
+          <p:cNvPr id="9" name="TextBox 8">
+            <a:extLst>
+              <a:ext uri="{FF2B5EF4-FFF2-40B4-BE49-F238E27FC236}">
+                <a16:creationId xmlns:a16="http://schemas.microsoft.com/office/drawing/2014/main" id="{0133BCEC-666D-BF54-9829-A0331D9AAE23}"/>
+              </a:ext>
+            </a:extLst>
+          </p:cNvPr>
+          <p:cNvSpPr txBox="1"/>
+          <p:nvPr/>
+        </p:nvSpPr>
+        <p:spPr>
+          <a:xfrm>
+            <a:off x="152401" y="1524000"/>
+            <a:ext cx="3702898" cy="615553"/>
+          </a:xfrm>
+          <a:prstGeom prst="rect">
+            <a:avLst/>
+          </a:prstGeom>
+          <a:solidFill>
+            <a:schemeClr val="bg1">
+              <a:alpha val="70000"/>
+            </a:schemeClr>
+          </a:solidFill>
+        </p:spPr>
+        <p:txBody>
+          <a:bodyPr wrap="square">
+            <a:spAutoFit/>
+          </a:bodyPr>
+          <a:lstStyle/>
+          <a:p>
+            <a:pPr algn="just"/>
+            <a:r>
+              <a:rPr lang="en-US" altLang="zh-CN" sz="1000" b="1" dirty="0">
+                <a:solidFill>
+                  <a:schemeClr val="tx2">
+                    <a:lumMod val="50000"/>
+                  </a:schemeClr>
+                </a:solidFill>
+              </a:rPr>
+              <a:t>Hypothesis:</a:t>
+            </a:r>
+            <a:endParaRPr lang="zh-CN" altLang="zh-CN" sz="1000" b="1" dirty="0">
               <a:solidFill>
                 <a:schemeClr val="tx2">
                   <a:lumMod val="50000"/>
@@ -3474,25 +3817,33 @@
             </a:endParaRPr>
           </a:p>
           <a:p>
-            <a:r>
-              <a:rPr lang="en-US" altLang="zh-CN" sz="1000" dirty="0">
+            <a:pPr algn="just"/>
+            <a:r>
+              <a:rPr lang="en-US" altLang="zh-CN" sz="800" dirty="0">
                 <a:solidFill>
                   <a:schemeClr val="tx2">
                     <a:lumMod val="50000"/>
                   </a:schemeClr>
                 </a:solidFill>
               </a:rPr>
-              <a:t>Xinyi Zeng</a:t>
-            </a:r>
+              <a:t>Whether an athlete reaches the final is determined by the form (performance) of the previous four years of competition, ignoring the effects of possible missed plays and opponent specificity in the actual Olympic competition.</a:t>
+            </a:r>
+            <a:endParaRPr lang="zh-CN" altLang="zh-CN" sz="800" dirty="0">
+              <a:solidFill>
+                <a:schemeClr val="tx2">
+                  <a:lumMod val="50000"/>
+                </a:schemeClr>
+              </a:solidFill>
+            </a:endParaRPr>
           </a:p>
         </p:txBody>
       </p:sp>
       <p:pic>
         <p:nvPicPr>
-          <p:cNvPr id="7" name="Picture 6" descr="A diagram of different colored lines&#10;&#10;Description automatically generated">
+          <p:cNvPr id="14" name="图片 2" descr="2a40d8b01ec532ba3ac903ad1acbafb">
             <a:extLst>
               <a:ext uri="{FF2B5EF4-FFF2-40B4-BE49-F238E27FC236}">
-                <a16:creationId xmlns:a16="http://schemas.microsoft.com/office/drawing/2014/main" id="{81BEC7F3-2374-A5C6-E1F2-B9225E594EC2}"/>
+                <a16:creationId xmlns:a16="http://schemas.microsoft.com/office/drawing/2014/main" id="{BA410A7D-20FC-25BC-CDD7-2489718CB214}"/>
               </a:ext>
             </a:extLst>
           </p:cNvPr>
@@ -3502,21 +3853,15 @@
           <p:nvPr/>
         </p:nvPicPr>
         <p:blipFill>
-          <a:blip r:embed="rId4" cstate="print">
-            <a:extLst>
-              <a:ext uri="{28A0092B-C50C-407E-A947-70E740481C1C}">
-                <a14:useLocalDpi xmlns:a14="http://schemas.microsoft.com/office/drawing/2010/main" val="0"/>
-              </a:ext>
-            </a:extLst>
-          </a:blip>
+          <a:blip r:embed="rId4"/>
           <a:stretch>
             <a:fillRect/>
           </a:stretch>
         </p:blipFill>
         <p:spPr>
           <a:xfrm>
-            <a:off x="221687" y="4404431"/>
-            <a:ext cx="3258113" cy="1964424"/>
+            <a:off x="159175" y="4953000"/>
+            <a:ext cx="3696121" cy="1323439"/>
           </a:xfrm>
           <a:prstGeom prst="rect">
             <a:avLst/>
@@ -3535,119 +3880,6 @@
       </p:pic>
       <p:sp>
         <p:nvSpPr>
-          <p:cNvPr id="9" name="TextBox 8">
-            <a:extLst>
-              <a:ext uri="{FF2B5EF4-FFF2-40B4-BE49-F238E27FC236}">
-                <a16:creationId xmlns:a16="http://schemas.microsoft.com/office/drawing/2014/main" id="{0133BCEC-666D-BF54-9829-A0331D9AAE23}"/>
-              </a:ext>
-            </a:extLst>
-          </p:cNvPr>
-          <p:cNvSpPr txBox="1"/>
-          <p:nvPr/>
-        </p:nvSpPr>
-        <p:spPr>
-          <a:xfrm>
-            <a:off x="304800" y="1556930"/>
-            <a:ext cx="2895600" cy="707886"/>
-          </a:xfrm>
-          <a:prstGeom prst="rect">
-            <a:avLst/>
-          </a:prstGeom>
-          <a:solidFill>
-            <a:schemeClr val="bg1">
-              <a:alpha val="40000"/>
-            </a:schemeClr>
-          </a:solidFill>
-        </p:spPr>
-        <p:txBody>
-          <a:bodyPr wrap="square">
-            <a:spAutoFit/>
-          </a:bodyPr>
-          <a:lstStyle/>
-          <a:p>
-            <a:pPr algn="just"/>
-            <a:r>
-              <a:rPr lang="en-US" altLang="zh-CN" sz="800" b="1" dirty="0">
-                <a:solidFill>
-                  <a:schemeClr val="tx2">
-                    <a:lumMod val="50000"/>
-                  </a:schemeClr>
-                </a:solidFill>
-              </a:rPr>
-              <a:t>Hypothesis:</a:t>
-            </a:r>
-            <a:endParaRPr lang="zh-CN" altLang="zh-CN" sz="800" b="1" dirty="0">
-              <a:solidFill>
-                <a:schemeClr val="tx2">
-                  <a:lumMod val="50000"/>
-                </a:schemeClr>
-              </a:solidFill>
-            </a:endParaRPr>
-          </a:p>
-          <a:p>
-            <a:pPr algn="just"/>
-            <a:r>
-              <a:rPr lang="en-US" altLang="zh-CN" sz="800" dirty="0">
-                <a:solidFill>
-                  <a:schemeClr val="tx2">
-                    <a:lumMod val="50000"/>
-                  </a:schemeClr>
-                </a:solidFill>
-              </a:rPr>
-              <a:t>Whether an athlete reaches the final is determined by the form (performance) of the previous four years of competition, ignoring the effects of possible missed plays and opponent specificity in the actual Olympic competition.</a:t>
-            </a:r>
-            <a:endParaRPr lang="zh-CN" altLang="zh-CN" sz="800" dirty="0">
-              <a:solidFill>
-                <a:schemeClr val="tx2">
-                  <a:lumMod val="50000"/>
-                </a:schemeClr>
-              </a:solidFill>
-            </a:endParaRPr>
-          </a:p>
-        </p:txBody>
-      </p:sp>
-      <p:pic>
-        <p:nvPicPr>
-          <p:cNvPr id="14" name="图片 2" descr="2a40d8b01ec532ba3ac903ad1acbafb">
-            <a:extLst>
-              <a:ext uri="{FF2B5EF4-FFF2-40B4-BE49-F238E27FC236}">
-                <a16:creationId xmlns:a16="http://schemas.microsoft.com/office/drawing/2014/main" id="{BA410A7D-20FC-25BC-CDD7-2489718CB214}"/>
-              </a:ext>
-            </a:extLst>
-          </p:cNvPr>
-          <p:cNvPicPr>
-            <a:picLocks noChangeAspect="1"/>
-          </p:cNvPicPr>
-          <p:nvPr/>
-        </p:nvPicPr>
-        <p:blipFill>
-          <a:blip r:embed="rId5"/>
-          <a:stretch>
-            <a:fillRect/>
-          </a:stretch>
-        </p:blipFill>
-        <p:spPr>
-          <a:xfrm>
-            <a:off x="215094" y="6739978"/>
-            <a:ext cx="5110397" cy="1849034"/>
-          </a:xfrm>
-          <a:prstGeom prst="rect">
-            <a:avLst/>
-          </a:prstGeom>
-          <a:ln>
-            <a:noFill/>
-          </a:ln>
-          <a:effectLst>
-            <a:outerShdw blurRad="292100" dist="139700" dir="2700000" algn="tl" rotWithShape="0">
-              <a:srgbClr val="333333">
-                <a:alpha val="65000"/>
-              </a:srgbClr>
-            </a:outerShdw>
-          </a:effectLst>
-        </p:spPr>
-      </p:pic>
-      <p:sp>
-        <p:nvSpPr>
           <p:cNvPr id="16" name="TextBox 15">
             <a:extLst>
               <a:ext uri="{FF2B5EF4-FFF2-40B4-BE49-F238E27FC236}">
@@ -3660,15 +3892,15 @@
         </p:nvSpPr>
         <p:spPr>
           <a:xfrm>
-            <a:off x="304800" y="2554512"/>
-            <a:ext cx="1447800" cy="1569660"/>
+            <a:off x="152400" y="2667000"/>
+            <a:ext cx="1315560" cy="1585049"/>
           </a:xfrm>
           <a:prstGeom prst="rect">
             <a:avLst/>
           </a:prstGeom>
           <a:solidFill>
             <a:schemeClr val="bg1">
-              <a:alpha val="40000"/>
+              <a:alpha val="70000"/>
             </a:schemeClr>
           </a:solidFill>
         </p:spPr>
@@ -3680,7 +3912,7 @@
           <a:p>
             <a:pPr algn="just"/>
             <a:r>
-              <a:rPr lang="en-US" altLang="zh-CN" sz="800" b="1" dirty="0">
+              <a:rPr lang="en-US" altLang="zh-CN" sz="1000" b="1" dirty="0">
                 <a:solidFill>
                   <a:schemeClr val="tx2">
                     <a:lumMod val="50000"/>
@@ -3689,7 +3921,7 @@
               </a:rPr>
               <a:t>Influencing Factors:</a:t>
             </a:r>
-            <a:endParaRPr lang="zh-CN" altLang="zh-CN" sz="800" b="1" dirty="0">
+            <a:endParaRPr lang="zh-CN" altLang="zh-CN" sz="1000" b="1" dirty="0">
               <a:solidFill>
                 <a:schemeClr val="tx2">
                   <a:lumMod val="50000"/>
@@ -3933,15 +4165,15 @@
         </p:nvSpPr>
         <p:spPr>
           <a:xfrm>
-            <a:off x="1825202" y="2580865"/>
-            <a:ext cx="1890183" cy="707886"/>
+            <a:off x="159175" y="4343400"/>
+            <a:ext cx="3702897" cy="492443"/>
           </a:xfrm>
           <a:prstGeom prst="rect">
             <a:avLst/>
           </a:prstGeom>
           <a:solidFill>
             <a:schemeClr val="bg1">
-              <a:alpha val="40000"/>
+              <a:alpha val="70000"/>
             </a:schemeClr>
           </a:solidFill>
         </p:spPr>
@@ -3953,7 +4185,7 @@
           <a:p>
             <a:pPr algn="just"/>
             <a:r>
-              <a:rPr lang="en-US" altLang="zh-CN" sz="800" b="1" dirty="0">
+              <a:rPr lang="en-US" altLang="zh-CN" sz="1000" b="1" dirty="0">
                 <a:solidFill>
                   <a:schemeClr val="tx2">
                     <a:lumMod val="50000"/>
@@ -3963,7 +4195,7 @@
               <a:t>Characteristic engineering</a:t>
             </a:r>
             <a:r>
-              <a:rPr lang="zh-CN" altLang="en-US" sz="800" b="1" dirty="0">
+              <a:rPr lang="zh-CN" altLang="en-US" sz="1000" b="1" dirty="0">
                 <a:solidFill>
                   <a:schemeClr val="tx2">
                     <a:lumMod val="50000"/>
@@ -3972,7 +4204,7 @@
               </a:rPr>
               <a:t>：</a:t>
             </a:r>
-            <a:endParaRPr lang="zh-CN" altLang="zh-CN" sz="800" b="1" dirty="0">
+            <a:endParaRPr lang="zh-CN" altLang="zh-CN" sz="1000" b="1" dirty="0">
               <a:solidFill>
                 <a:schemeClr val="tx2">
                   <a:lumMod val="50000"/>
@@ -3990,7 +4222,7 @@
                   </a:schemeClr>
                 </a:solidFill>
               </a:rPr>
-              <a:t>Handling of outliers and missing values</a:t>
+              <a:t>1. Handling of outliers and missing values      2. Data formatting</a:t>
             </a:r>
             <a:endParaRPr lang="zh-CN" altLang="zh-CN" sz="800" dirty="0">
               <a:solidFill>
@@ -4010,47 +4242,7 @@
                   </a:schemeClr>
                 </a:solidFill>
               </a:rPr>
-              <a:t>Data formatting</a:t>
-            </a:r>
-            <a:endParaRPr lang="zh-CN" altLang="zh-CN" sz="800" dirty="0">
-              <a:solidFill>
-                <a:schemeClr val="tx2">
-                  <a:lumMod val="50000"/>
-                </a:schemeClr>
-              </a:solidFill>
-            </a:endParaRPr>
-          </a:p>
-          <a:p>
-            <a:pPr algn="just"/>
-            <a:r>
-              <a:rPr lang="en-US" altLang="zh-CN" sz="800" dirty="0">
-                <a:solidFill>
-                  <a:schemeClr val="tx2">
-                    <a:lumMod val="50000"/>
-                  </a:schemeClr>
-                </a:solidFill>
-              </a:rPr>
-              <a:t>normalization of data</a:t>
-            </a:r>
-            <a:endParaRPr lang="zh-CN" altLang="zh-CN" sz="800" dirty="0">
-              <a:solidFill>
-                <a:schemeClr val="tx2">
-                  <a:lumMod val="50000"/>
-                </a:schemeClr>
-              </a:solidFill>
-            </a:endParaRPr>
-          </a:p>
-          <a:p>
-            <a:pPr algn="just"/>
-            <a:r>
-              <a:rPr lang="en-US" altLang="zh-CN" sz="800" dirty="0">
-                <a:solidFill>
-                  <a:schemeClr val="tx2">
-                    <a:lumMod val="50000"/>
-                  </a:schemeClr>
-                </a:solidFill>
-              </a:rPr>
-              <a:t>Pearson correlation analysis</a:t>
+              <a:t>3. Normalization of data                                      4. Pearson correlation analysis</a:t>
             </a:r>
             <a:endParaRPr lang="zh-CN" altLang="zh-CN" sz="800" dirty="0">
               <a:solidFill>
@@ -4077,7 +4269,7 @@
           <p:nvPr/>
         </p:nvPicPr>
         <p:blipFill>
-          <a:blip r:embed="rId6" cstate="print">
+          <a:blip r:embed="rId5" cstate="print">
             <a:extLst>
               <a:ext uri="{28A0092B-C50C-407E-A947-70E740481C1C}">
                 <a14:useLocalDpi xmlns:a14="http://schemas.microsoft.com/office/drawing/2010/main" val="0"/>
@@ -4090,8 +4282,8 @@
         </p:blipFill>
         <p:spPr>
           <a:xfrm>
-            <a:off x="3794339" y="1981200"/>
-            <a:ext cx="2622125" cy="1958296"/>
+            <a:off x="4007699" y="1752600"/>
+            <a:ext cx="2774101" cy="1958296"/>
           </a:xfrm>
           <a:prstGeom prst="rect">
             <a:avLst/>
@@ -4123,7 +4315,7 @@
           <p:nvPr/>
         </p:nvPicPr>
         <p:blipFill>
-          <a:blip r:embed="rId7" cstate="print">
+          <a:blip r:embed="rId6" cstate="print">
             <a:extLst>
               <a:ext uri="{28A0092B-C50C-407E-A947-70E740481C1C}">
                 <a14:useLocalDpi xmlns:a14="http://schemas.microsoft.com/office/drawing/2010/main" val="0"/>
@@ -4136,8 +4328,8 @@
         </p:blipFill>
         <p:spPr>
           <a:xfrm>
-            <a:off x="3787987" y="4481440"/>
-            <a:ext cx="2810088" cy="2122279"/>
+            <a:off x="4010236" y="5334000"/>
+            <a:ext cx="2771564" cy="2122279"/>
           </a:xfrm>
           <a:prstGeom prst="rect">
             <a:avLst/>
@@ -4168,8 +4360,8 @@
         </p:nvSpPr>
         <p:spPr>
           <a:xfrm>
-            <a:off x="3274828" y="1585153"/>
-            <a:ext cx="2667000" cy="369332"/>
+            <a:off x="3954779" y="1352490"/>
+            <a:ext cx="2921002" cy="400110"/>
           </a:xfrm>
           <a:prstGeom prst="rect">
             <a:avLst/>
@@ -4183,46 +4375,40 @@
           <a:lstStyle/>
           <a:p>
             <a:r>
-              <a:rPr lang="en-US" altLang="zh-CN" b="1" dirty="0"/>
+              <a:rPr lang="en-US" altLang="zh-CN" sz="2000" b="1" dirty="0">
+                <a:ln w="9525">
+                  <a:solidFill>
+                    <a:schemeClr val="bg1"/>
+                  </a:solidFill>
+                  <a:prstDash val="solid"/>
+                </a:ln>
+                <a:effectLst>
+                  <a:outerShdw blurRad="12700" dist="38100" dir="2700000" algn="tl" rotWithShape="0">
+                    <a:schemeClr val="accent5">
+                      <a:lumMod val="60000"/>
+                      <a:lumOff val="40000"/>
+                    </a:schemeClr>
+                  </a:outerShdw>
+                </a:effectLst>
+              </a:rPr>
               <a:t>Logistic Regression Model</a:t>
             </a:r>
-            <a:endParaRPr lang="zh-CN" altLang="en-US" b="1" dirty="0"/>
-          </a:p>
-        </p:txBody>
-      </p:sp>
-      <p:sp>
-        <p:nvSpPr>
-          <p:cNvPr id="19" name="TextBox 18">
-            <a:extLst>
-              <a:ext uri="{FF2B5EF4-FFF2-40B4-BE49-F238E27FC236}">
-                <a16:creationId xmlns:a16="http://schemas.microsoft.com/office/drawing/2014/main" id="{D405FD3B-E4BB-221E-78B4-2DB41EA33CDD}"/>
-              </a:ext>
-            </a:extLst>
-          </p:cNvPr>
-          <p:cNvSpPr txBox="1"/>
-          <p:nvPr/>
-        </p:nvSpPr>
-        <p:spPr>
-          <a:xfrm>
-            <a:off x="3352801" y="3994089"/>
-            <a:ext cx="2667000" cy="369332"/>
-          </a:xfrm>
-          <a:prstGeom prst="rect">
-            <a:avLst/>
-          </a:prstGeom>
-          <a:noFill/>
-        </p:spPr>
-        <p:txBody>
-          <a:bodyPr wrap="square" rtlCol="0">
-            <a:spAutoFit/>
-          </a:bodyPr>
-          <a:lstStyle/>
-          <a:p>
-            <a:r>
-              <a:rPr lang="en-US" altLang="zh-CN" b="1" dirty="0"/>
-              <a:t>Main Model</a:t>
-            </a:r>
-            <a:endParaRPr lang="zh-CN" altLang="en-US" b="1" dirty="0"/>
+            <a:endParaRPr lang="zh-CN" altLang="en-US" sz="2000" b="1" dirty="0">
+              <a:ln w="9525">
+                <a:solidFill>
+                  <a:schemeClr val="bg1"/>
+                </a:solidFill>
+                <a:prstDash val="solid"/>
+              </a:ln>
+              <a:effectLst>
+                <a:outerShdw blurRad="12700" dist="38100" dir="2700000" algn="tl" rotWithShape="0">
+                  <a:schemeClr val="accent5">
+                    <a:lumMod val="60000"/>
+                    <a:lumOff val="40000"/>
+                  </a:schemeClr>
+                </a:outerShdw>
+              </a:effectLst>
+            </a:endParaRPr>
           </a:p>
         </p:txBody>
       </p:sp>
@@ -4240,15 +4426,15 @@
         </p:nvSpPr>
         <p:spPr>
           <a:xfrm>
-            <a:off x="5414434" y="6958131"/>
-            <a:ext cx="1443566" cy="707886"/>
+            <a:off x="1123804" y="8716489"/>
+            <a:ext cx="2728960" cy="430887"/>
           </a:xfrm>
           <a:prstGeom prst="rect">
             <a:avLst/>
           </a:prstGeom>
           <a:solidFill>
             <a:schemeClr val="bg1">
-              <a:alpha val="40000"/>
+              <a:alpha val="70000"/>
             </a:schemeClr>
           </a:solidFill>
         </p:spPr>
@@ -4259,7 +4445,7 @@
           <a:lstStyle/>
           <a:p>
             <a:r>
-              <a:rPr lang="en-US" altLang="zh-CN" sz="1000" dirty="0">
+              <a:rPr lang="en-US" altLang="zh-CN" sz="1050" dirty="0">
                 <a:solidFill>
                   <a:schemeClr val="tx2">
                     <a:lumMod val="50000"/>
@@ -4269,7 +4455,7 @@
               <a:t>More information can be found on </a:t>
             </a:r>
             <a:r>
-              <a:rPr lang="en-US" altLang="zh-CN" sz="1000" dirty="0" err="1">
+              <a:rPr lang="en-US" altLang="zh-CN" sz="1050" dirty="0" err="1">
                 <a:solidFill>
                   <a:schemeClr val="tx2">
                     <a:lumMod val="50000"/>
@@ -4279,7 +4465,7 @@
               <a:t>Github</a:t>
             </a:r>
             <a:r>
-              <a:rPr lang="en-US" altLang="zh-CN" sz="1000" dirty="0">
+              <a:rPr lang="en-US" altLang="zh-CN" sz="1050" dirty="0">
                 <a:solidFill>
                   <a:schemeClr val="tx2">
                     <a:lumMod val="50000"/>
@@ -4291,7 +4477,7 @@
           </a:p>
           <a:p>
             <a:r>
-              <a:rPr lang="en-US" altLang="zh-CN" sz="1000" u="sng" dirty="0">
+              <a:rPr lang="en-US" altLang="zh-CN" sz="1050" u="sng" dirty="0">
                 <a:solidFill>
                   <a:schemeClr val="tx2">
                     <a:lumMod val="50000"/>
@@ -4300,7 +4486,7 @@
               </a:rPr>
               <a:t>https://github.com/dashen2004/NUS_Group3</a:t>
             </a:r>
-            <a:endParaRPr lang="zh-CN" altLang="en-US" sz="1000" u="sng" dirty="0">
+            <a:endParaRPr lang="zh-CN" altLang="en-US" sz="1050" u="sng" dirty="0">
               <a:solidFill>
                 <a:schemeClr val="tx2">
                   <a:lumMod val="50000"/>
@@ -4310,6 +4496,565 @@
           </a:p>
         </p:txBody>
       </p:sp>
+      <p:sp>
+        <p:nvSpPr>
+          <p:cNvPr id="23" name="TextBox 22">
+            <a:extLst>
+              <a:ext uri="{FF2B5EF4-FFF2-40B4-BE49-F238E27FC236}">
+                <a16:creationId xmlns:a16="http://schemas.microsoft.com/office/drawing/2014/main" id="{648C3905-599B-E0C3-3C3F-F53D54490396}"/>
+              </a:ext>
+            </a:extLst>
+          </p:cNvPr>
+          <p:cNvSpPr txBox="1"/>
+          <p:nvPr/>
+        </p:nvSpPr>
+        <p:spPr>
+          <a:xfrm>
+            <a:off x="4007700" y="7451229"/>
+            <a:ext cx="2771564" cy="1692771"/>
+          </a:xfrm>
+          <a:prstGeom prst="rect">
+            <a:avLst/>
+          </a:prstGeom>
+          <a:solidFill>
+            <a:schemeClr val="bg1">
+              <a:alpha val="70000"/>
+            </a:schemeClr>
+          </a:solidFill>
+        </p:spPr>
+        <p:txBody>
+          <a:bodyPr wrap="square" rtlCol="0">
+            <a:spAutoFit/>
+          </a:bodyPr>
+          <a:lstStyle/>
+          <a:p>
+            <a:r>
+              <a:rPr lang="en-US" altLang="zh-CN" sz="800" dirty="0"/>
+              <a:t>The classification report for main model provides an overview of the model's performance across nine classes (1 to 9). The precision values are all very high, ranging from 0.867 to 0.990, indicating that the majority of positive predictions for each class are correct. Recall values are similarly high, from 0.997 to 0.929, suggesting that the model successfully identifies most of the actual positive cases. The F1-scores, which balance precision and recall, reflect this consistency, with all values above 0.85. The overall accuracy of the model is 0.990, demonstrating excellent performance and reliability across all classes. This classification report highlights a robust model with consistent and reliable performance in predicting outcomes for each class.</a:t>
+            </a:r>
+            <a:endParaRPr lang="zh-CN" altLang="en-US" sz="800" dirty="0"/>
+          </a:p>
+        </p:txBody>
+      </p:sp>
+      <p:sp>
+        <p:nvSpPr>
+          <p:cNvPr id="5" name="TextBox 4">
+            <a:extLst>
+              <a:ext uri="{FF2B5EF4-FFF2-40B4-BE49-F238E27FC236}">
+                <a16:creationId xmlns:a16="http://schemas.microsoft.com/office/drawing/2014/main" id="{576B51C1-4E1D-DDF5-8C9A-F111482EB1A8}"/>
+              </a:ext>
+            </a:extLst>
+          </p:cNvPr>
+          <p:cNvSpPr txBox="1"/>
+          <p:nvPr/>
+        </p:nvSpPr>
+        <p:spPr>
+          <a:xfrm>
+            <a:off x="4007699" y="3705761"/>
+            <a:ext cx="2774101" cy="1323439"/>
+          </a:xfrm>
+          <a:prstGeom prst="rect">
+            <a:avLst/>
+          </a:prstGeom>
+          <a:solidFill>
+            <a:schemeClr val="bg1">
+              <a:alpha val="70000"/>
+            </a:schemeClr>
+          </a:solidFill>
+        </p:spPr>
+        <p:txBody>
+          <a:bodyPr wrap="square" rtlCol="0">
+            <a:spAutoFit/>
+          </a:bodyPr>
+          <a:lstStyle/>
+          <a:p>
+            <a:r>
+              <a:rPr lang="en-US" altLang="zh-CN" sz="800" dirty="0">
+                <a:solidFill>
+                  <a:schemeClr val="tx2">
+                    <a:lumMod val="50000"/>
+                  </a:schemeClr>
+                </a:solidFill>
+              </a:rPr>
+              <a:t>Our classification report for logistic regression model provides balanced precision, recall, and F1-scores around 0.64-0.65. </a:t>
+            </a:r>
+            <a:r>
+              <a:rPr lang="en-US" altLang="zh-CN" sz="800" dirty="0"/>
+              <a:t>The precision for both classes (0 and 1) is 0.64, indicating that 64% of the predicted positives are true positives. The recall values are 0.65 for class 0 and 0.63 for class 1, showing the model's ability to identify actual positives. The overall accuracy is 0.64, suggesting the model correctly classifies 64% of instances. </a:t>
+            </a:r>
+            <a:r>
+              <a:rPr lang="en-US" altLang="zh-CN" sz="800" dirty="0">
+                <a:solidFill>
+                  <a:schemeClr val="tx2">
+                    <a:lumMod val="50000"/>
+                  </a:schemeClr>
+                </a:solidFill>
+              </a:rPr>
+              <a:t>Overall, the model shows balanced performance with areas for improvement in feature engineering and model tuning.</a:t>
+            </a:r>
+            <a:endParaRPr lang="zh-CN" altLang="en-US" sz="800" dirty="0">
+              <a:solidFill>
+                <a:schemeClr val="tx2">
+                  <a:lumMod val="50000"/>
+                </a:schemeClr>
+              </a:solidFill>
+            </a:endParaRPr>
+          </a:p>
+        </p:txBody>
+      </p:sp>
+      <p:sp>
+        <p:nvSpPr>
+          <p:cNvPr id="13" name="TextBox 12">
+            <a:extLst>
+              <a:ext uri="{FF2B5EF4-FFF2-40B4-BE49-F238E27FC236}">
+                <a16:creationId xmlns:a16="http://schemas.microsoft.com/office/drawing/2014/main" id="{3C43397B-A71C-4EAF-C638-7B4A7CD78430}"/>
+              </a:ext>
+            </a:extLst>
+          </p:cNvPr>
+          <p:cNvSpPr txBox="1"/>
+          <p:nvPr/>
+        </p:nvSpPr>
+        <p:spPr>
+          <a:xfrm>
+            <a:off x="159175" y="2209800"/>
+            <a:ext cx="3702897" cy="369332"/>
+          </a:xfrm>
+          <a:prstGeom prst="rect">
+            <a:avLst/>
+          </a:prstGeom>
+          <a:solidFill>
+            <a:schemeClr val="bg1">
+              <a:alpha val="70000"/>
+            </a:schemeClr>
+          </a:solidFill>
+        </p:spPr>
+        <p:txBody>
+          <a:bodyPr wrap="square" rtlCol="0">
+            <a:spAutoFit/>
+          </a:bodyPr>
+          <a:lstStyle/>
+          <a:p>
+            <a:r>
+              <a:rPr lang="en-US" altLang="zh-CN" sz="1000" b="1" dirty="0">
+                <a:solidFill>
+                  <a:schemeClr val="tx2">
+                    <a:lumMod val="50000"/>
+                  </a:schemeClr>
+                </a:solidFill>
+              </a:rPr>
+              <a:t>Web Mining:</a:t>
+            </a:r>
+          </a:p>
+          <a:p>
+            <a:r>
+              <a:rPr lang="en-US" altLang="zh-CN" sz="800" dirty="0">
+                <a:solidFill>
+                  <a:schemeClr val="tx2">
+                    <a:lumMod val="50000"/>
+                  </a:schemeClr>
+                </a:solidFill>
+              </a:rPr>
+              <a:t>Data were collected from </a:t>
+            </a:r>
+            <a:r>
+              <a:rPr lang="en-US" altLang="zh-CN" sz="800" u="sng" dirty="0">
+                <a:solidFill>
+                  <a:schemeClr val="tx2">
+                    <a:lumMod val="50000"/>
+                  </a:schemeClr>
+                </a:solidFill>
+              </a:rPr>
+              <a:t>https://worldathletics.org</a:t>
+            </a:r>
+          </a:p>
+        </p:txBody>
+      </p:sp>
+      <p:sp>
+        <p:nvSpPr>
+          <p:cNvPr id="22" name="Rectangle 21">
+            <a:extLst>
+              <a:ext uri="{FF2B5EF4-FFF2-40B4-BE49-F238E27FC236}">
+                <a16:creationId xmlns:a16="http://schemas.microsoft.com/office/drawing/2014/main" id="{00424263-7B49-916A-B90F-4182C49BDD47}"/>
+              </a:ext>
+            </a:extLst>
+          </p:cNvPr>
+          <p:cNvSpPr/>
+          <p:nvPr/>
+        </p:nvSpPr>
+        <p:spPr>
+          <a:xfrm>
+            <a:off x="4713896" y="4953000"/>
+            <a:ext cx="1486304" cy="400110"/>
+          </a:xfrm>
+          <a:prstGeom prst="rect">
+            <a:avLst/>
+          </a:prstGeom>
+          <a:noFill/>
+        </p:spPr>
+        <p:txBody>
+          <a:bodyPr wrap="none" lIns="91440" tIns="45720" rIns="91440" bIns="45720">
+            <a:spAutoFit/>
+          </a:bodyPr>
+          <a:lstStyle/>
+          <a:p>
+            <a:pPr algn="ctr"/>
+            <a:r>
+              <a:rPr lang="en-GB" altLang="zh-CN" sz="2000" b="1" cap="none" spc="0" dirty="0">
+                <a:ln w="9525">
+                  <a:solidFill>
+                    <a:schemeClr val="bg1"/>
+                  </a:solidFill>
+                  <a:prstDash val="solid"/>
+                </a:ln>
+                <a:effectLst>
+                  <a:outerShdw blurRad="12700" dist="38100" dir="2700000" algn="tl" rotWithShape="0">
+                    <a:schemeClr val="accent5">
+                      <a:lumMod val="60000"/>
+                      <a:lumOff val="40000"/>
+                    </a:schemeClr>
+                  </a:outerShdw>
+                </a:effectLst>
+              </a:rPr>
+              <a:t>Main Model</a:t>
+            </a:r>
+          </a:p>
+        </p:txBody>
+      </p:sp>
+      <p:sp>
+        <p:nvSpPr>
+          <p:cNvPr id="24" name="TextBox 23">
+            <a:extLst>
+              <a:ext uri="{FF2B5EF4-FFF2-40B4-BE49-F238E27FC236}">
+                <a16:creationId xmlns:a16="http://schemas.microsoft.com/office/drawing/2014/main" id="{3A440D95-1EFA-DD5C-7989-93B5CB0DBB93}"/>
+              </a:ext>
+            </a:extLst>
+          </p:cNvPr>
+          <p:cNvSpPr txBox="1"/>
+          <p:nvPr/>
+        </p:nvSpPr>
+        <p:spPr>
+          <a:xfrm>
+            <a:off x="159174" y="6324600"/>
+            <a:ext cx="2583701" cy="1384995"/>
+          </a:xfrm>
+          <a:prstGeom prst="rect">
+            <a:avLst/>
+          </a:prstGeom>
+          <a:solidFill>
+            <a:schemeClr val="bg1">
+              <a:alpha val="70000"/>
+            </a:schemeClr>
+          </a:solidFill>
+        </p:spPr>
+        <p:txBody>
+          <a:bodyPr wrap="square" rtlCol="0">
+            <a:spAutoFit/>
+          </a:bodyPr>
+          <a:lstStyle/>
+          <a:p>
+            <a:r>
+              <a:rPr lang="en-US" altLang="zh-CN" sz="1000" b="1" dirty="0">
+                <a:solidFill>
+                  <a:schemeClr val="tx2">
+                    <a:lumMod val="50000"/>
+                  </a:schemeClr>
+                </a:solidFill>
+              </a:rPr>
+              <a:t>Conclusion:</a:t>
+            </a:r>
+          </a:p>
+          <a:p>
+            <a:r>
+              <a:rPr lang="en-US" altLang="zh-CN" sz="800" dirty="0"/>
+              <a:t>· Our logistic regression model, although scientifically sound and robust, has shown limited accuracy.</a:t>
+            </a:r>
+          </a:p>
+          <a:p>
+            <a:r>
+              <a:rPr lang="en-US" altLang="zh-CN" sz="800" dirty="0"/>
+              <a:t> · Conversely, the random forest model displays exceedingly high accuracy. However, its simulation does not perfectly align with real-world conditions, indicating a need for further optimization and adjustments. </a:t>
+            </a:r>
+          </a:p>
+          <a:p>
+            <a:r>
+              <a:rPr lang="en-US" altLang="zh-CN" sz="800" dirty="0"/>
+              <a:t>· The image on the right highlights the random forest model's predictions for strong contenders likely to reach the finals.</a:t>
+            </a:r>
+            <a:endParaRPr lang="en-US" altLang="zh-CN" sz="1000" b="1" dirty="0">
+              <a:solidFill>
+                <a:schemeClr val="tx2">
+                  <a:lumMod val="50000"/>
+                </a:schemeClr>
+              </a:solidFill>
+            </a:endParaRPr>
+          </a:p>
+        </p:txBody>
+      </p:sp>
+      <p:sp>
+        <p:nvSpPr>
+          <p:cNvPr id="25" name="TextBox 24">
+            <a:extLst>
+              <a:ext uri="{FF2B5EF4-FFF2-40B4-BE49-F238E27FC236}">
+                <a16:creationId xmlns:a16="http://schemas.microsoft.com/office/drawing/2014/main" id="{EC10AFA7-06E2-C454-685F-12CCB9F9121A}"/>
+              </a:ext>
+            </a:extLst>
+          </p:cNvPr>
+          <p:cNvSpPr txBox="1"/>
+          <p:nvPr/>
+        </p:nvSpPr>
+        <p:spPr>
+          <a:xfrm>
+            <a:off x="159174" y="7772400"/>
+            <a:ext cx="2583701" cy="861774"/>
+          </a:xfrm>
+          <a:prstGeom prst="rect">
+            <a:avLst/>
+          </a:prstGeom>
+          <a:solidFill>
+            <a:schemeClr val="bg1">
+              <a:alpha val="70000"/>
+            </a:schemeClr>
+          </a:solidFill>
+        </p:spPr>
+        <p:txBody>
+          <a:bodyPr wrap="square" rtlCol="0">
+            <a:spAutoFit/>
+          </a:bodyPr>
+          <a:lstStyle/>
+          <a:p>
+            <a:r>
+              <a:rPr lang="en-US" altLang="zh-CN" sz="1000" b="1" dirty="0">
+                <a:solidFill>
+                  <a:schemeClr val="tx2">
+                    <a:lumMod val="50000"/>
+                  </a:schemeClr>
+                </a:solidFill>
+              </a:rPr>
+              <a:t>Further Research:</a:t>
+            </a:r>
+          </a:p>
+          <a:p>
+            <a:r>
+              <a:rPr lang="en-US" altLang="zh-CN" sz="800" dirty="0">
+                <a:solidFill>
+                  <a:schemeClr val="tx2">
+                    <a:lumMod val="50000"/>
+                  </a:schemeClr>
+                </a:solidFill>
+              </a:rPr>
+              <a:t>For future work, we plan to refine our models using additional data and advanced feature engineering techniques. Continuous improvement and validation of the models will help in achieving more accurate predictions.</a:t>
+            </a:r>
+            <a:endParaRPr lang="zh-CN" altLang="en-US" sz="800" dirty="0">
+              <a:solidFill>
+                <a:schemeClr val="tx2">
+                  <a:lumMod val="50000"/>
+                </a:schemeClr>
+              </a:solidFill>
+            </a:endParaRPr>
+          </a:p>
+        </p:txBody>
+      </p:sp>
+      <p:sp>
+        <p:nvSpPr>
+          <p:cNvPr id="2" name="Rectangle 1">
+            <a:extLst>
+              <a:ext uri="{FF2B5EF4-FFF2-40B4-BE49-F238E27FC236}">
+                <a16:creationId xmlns:a16="http://schemas.microsoft.com/office/drawing/2014/main" id="{67581FE2-939B-F7C0-6AAF-6418EC301A6D}"/>
+              </a:ext>
+            </a:extLst>
+          </p:cNvPr>
+          <p:cNvSpPr/>
+          <p:nvPr/>
+        </p:nvSpPr>
+        <p:spPr>
+          <a:xfrm>
+            <a:off x="-1" y="9128760"/>
+            <a:ext cx="6858000" cy="777240"/>
+          </a:xfrm>
+          <a:prstGeom prst="rect">
+            <a:avLst/>
+          </a:prstGeom>
+          <a:solidFill>
+            <a:srgbClr val="F68B1F"/>
+          </a:solidFill>
+          <a:ln>
+            <a:noFill/>
+          </a:ln>
+        </p:spPr>
+        <p:style>
+          <a:lnRef idx="2">
+            <a:schemeClr val="accent1">
+              <a:shade val="50000"/>
+            </a:schemeClr>
+          </a:lnRef>
+          <a:fillRef idx="1">
+            <a:schemeClr val="accent1"/>
+          </a:fillRef>
+          <a:effectRef idx="0">
+            <a:schemeClr val="accent1"/>
+          </a:effectRef>
+          <a:fontRef idx="minor">
+            <a:schemeClr val="lt1"/>
+          </a:fontRef>
+        </p:style>
+        <p:txBody>
+          <a:bodyPr rtlCol="0" anchor="ctr"/>
+          <a:lstStyle/>
+          <a:p>
+            <a:pPr algn="ctr"/>
+            <a:endParaRPr lang="en-US" dirty="0"/>
+          </a:p>
+        </p:txBody>
+      </p:sp>
+      <p:pic>
+        <p:nvPicPr>
+          <p:cNvPr id="4" name="Picture 3" descr="A close-up of a logo&#10;&#10;Description automatically generated">
+            <a:extLst>
+              <a:ext uri="{FF2B5EF4-FFF2-40B4-BE49-F238E27FC236}">
+                <a16:creationId xmlns:a16="http://schemas.microsoft.com/office/drawing/2014/main" id="{9D9F0D89-AF42-4B94-F6CA-26B23249F383}"/>
+              </a:ext>
+            </a:extLst>
+          </p:cNvPr>
+          <p:cNvPicPr>
+            <a:picLocks noChangeAspect="1"/>
+          </p:cNvPicPr>
+          <p:nvPr/>
+        </p:nvPicPr>
+        <p:blipFill>
+          <a:blip r:embed="rId7" cstate="print">
+            <a:extLst>
+              <a:ext uri="{28A0092B-C50C-407E-A947-70E740481C1C}">
+                <a14:useLocalDpi xmlns:a14="http://schemas.microsoft.com/office/drawing/2010/main" val="0"/>
+              </a:ext>
+            </a:extLst>
+          </a:blip>
+          <a:stretch>
+            <a:fillRect/>
+          </a:stretch>
+        </p:blipFill>
+        <p:spPr>
+          <a:xfrm>
+            <a:off x="5025656" y="9255763"/>
+            <a:ext cx="1832344" cy="523234"/>
+          </a:xfrm>
+          <a:prstGeom prst="rect">
+            <a:avLst/>
+          </a:prstGeom>
+        </p:spPr>
+      </p:pic>
+      <p:sp>
+        <p:nvSpPr>
+          <p:cNvPr id="28" name="TextBox 27">
+            <a:extLst>
+              <a:ext uri="{FF2B5EF4-FFF2-40B4-BE49-F238E27FC236}">
+                <a16:creationId xmlns:a16="http://schemas.microsoft.com/office/drawing/2014/main" id="{D3E183E0-6D24-8B7E-2A5C-3EE064106518}"/>
+              </a:ext>
+            </a:extLst>
+          </p:cNvPr>
+          <p:cNvSpPr txBox="1"/>
+          <p:nvPr/>
+        </p:nvSpPr>
+        <p:spPr>
+          <a:xfrm>
+            <a:off x="152400" y="9371186"/>
+            <a:ext cx="3962400" cy="292388"/>
+          </a:xfrm>
+          <a:prstGeom prst="rect">
+            <a:avLst/>
+          </a:prstGeom>
+          <a:noFill/>
+        </p:spPr>
+        <p:txBody>
+          <a:bodyPr wrap="square" rtlCol="0">
+            <a:spAutoFit/>
+          </a:bodyPr>
+          <a:lstStyle/>
+          <a:p>
+            <a:r>
+              <a:rPr lang="en-US" sz="1280" b="1" dirty="0">
+                <a:solidFill>
+                  <a:schemeClr val="bg1"/>
+                </a:solidFill>
+                <a:latin typeface="Verdana" panose="020B0604030504040204" pitchFamily="34" charset="0"/>
+                <a:ea typeface="Verdana" panose="020B0604030504040204" pitchFamily="34" charset="0"/>
+              </a:rPr>
+              <a:t>NUS SOC Summer Workshop 2024</a:t>
+            </a:r>
+          </a:p>
+        </p:txBody>
+      </p:sp>
+      <p:pic>
+        <p:nvPicPr>
+          <p:cNvPr id="32" name="Picture 31" descr="A screenshot of a table&#10;&#10;Description automatically generated">
+            <a:extLst>
+              <a:ext uri="{FF2B5EF4-FFF2-40B4-BE49-F238E27FC236}">
+                <a16:creationId xmlns:a16="http://schemas.microsoft.com/office/drawing/2014/main" id="{1DBC8E4D-5563-CCF3-A774-38BBD853AB61}"/>
+              </a:ext>
+            </a:extLst>
+          </p:cNvPr>
+          <p:cNvPicPr>
+            <a:picLocks noChangeAspect="1"/>
+          </p:cNvPicPr>
+          <p:nvPr/>
+        </p:nvPicPr>
+        <p:blipFill>
+          <a:blip r:embed="rId8">
+            <a:extLst>
+              <a:ext uri="{28A0092B-C50C-407E-A947-70E740481C1C}">
+                <a14:useLocalDpi xmlns:a14="http://schemas.microsoft.com/office/drawing/2010/main" val="0"/>
+              </a:ext>
+            </a:extLst>
+          </a:blip>
+          <a:stretch>
+            <a:fillRect/>
+          </a:stretch>
+        </p:blipFill>
+        <p:spPr>
+          <a:xfrm>
+            <a:off x="2820343" y="6324600"/>
+            <a:ext cx="1032421" cy="2316274"/>
+          </a:xfrm>
+          <a:prstGeom prst="rect">
+            <a:avLst/>
+          </a:prstGeom>
+        </p:spPr>
+      </p:pic>
+      <p:pic>
+        <p:nvPicPr>
+          <p:cNvPr id="34" name="Picture 33" descr="A diagram of different colored lines&#10;&#10;Description automatically generated">
+            <a:extLst>
+              <a:ext uri="{FF2B5EF4-FFF2-40B4-BE49-F238E27FC236}">
+                <a16:creationId xmlns:a16="http://schemas.microsoft.com/office/drawing/2014/main" id="{B18B4309-13CD-E7F9-E7F4-97012D89C2A6}"/>
+              </a:ext>
+            </a:extLst>
+          </p:cNvPr>
+          <p:cNvPicPr>
+            <a:picLocks noChangeAspect="1"/>
+          </p:cNvPicPr>
+          <p:nvPr/>
+        </p:nvPicPr>
+        <p:blipFill>
+          <a:blip r:embed="rId9" cstate="print">
+            <a:extLst>
+              <a:ext uri="{28A0092B-C50C-407E-A947-70E740481C1C}">
+                <a14:useLocalDpi xmlns:a14="http://schemas.microsoft.com/office/drawing/2010/main" val="0"/>
+              </a:ext>
+            </a:extLst>
+          </a:blip>
+          <a:stretch>
+            <a:fillRect/>
+          </a:stretch>
+        </p:blipFill>
+        <p:spPr>
+          <a:xfrm>
+            <a:off x="1620360" y="2670483"/>
+            <a:ext cx="2232403" cy="1590602"/>
+          </a:xfrm>
+          <a:prstGeom prst="rect">
+            <a:avLst/>
+          </a:prstGeom>
+        </p:spPr>
+      </p:pic>
     </p:spTree>
   </p:cSld>
   <p:clrMapOvr>
@@ -4599,4 +5344,319 @@
   <a:objectDefaults/>
   <a:extraClrSchemeLst/>
 </a:theme>
+</file>
+
+<file path=ppt/theme/theme2.xml><?xml version="1.0" encoding="utf-8"?>
+<a:theme xmlns:a="http://schemas.openxmlformats.org/drawingml/2006/main" name="Office Theme">
+  <a:themeElements>
+    <a:clrScheme name="Office">
+      <a:dk1>
+        <a:sysClr val="windowText" lastClr="000000"/>
+      </a:dk1>
+      <a:lt1>
+        <a:sysClr val="window" lastClr="FFFFFF"/>
+      </a:lt1>
+      <a:dk2>
+        <a:srgbClr val="0E2841"/>
+      </a:dk2>
+      <a:lt2>
+        <a:srgbClr val="E8E8E8"/>
+      </a:lt2>
+      <a:accent1>
+        <a:srgbClr val="156082"/>
+      </a:accent1>
+      <a:accent2>
+        <a:srgbClr val="E97132"/>
+      </a:accent2>
+      <a:accent3>
+        <a:srgbClr val="196B24"/>
+      </a:accent3>
+      <a:accent4>
+        <a:srgbClr val="0F9ED5"/>
+      </a:accent4>
+      <a:accent5>
+        <a:srgbClr val="A02B93"/>
+      </a:accent5>
+      <a:accent6>
+        <a:srgbClr val="4EA72E"/>
+      </a:accent6>
+      <a:hlink>
+        <a:srgbClr val="467886"/>
+      </a:hlink>
+      <a:folHlink>
+        <a:srgbClr val="96607D"/>
+      </a:folHlink>
+    </a:clrScheme>
+    <a:fontScheme name="Office">
+      <a:majorFont>
+        <a:latin typeface="等线 Light" panose="02110004020202020204"/>
+        <a:ea typeface=""/>
+        <a:cs typeface=""/>
+        <a:font script="Jpan" typeface="游ゴシック Light"/>
+        <a:font script="Hang" typeface="맑은 고딕"/>
+        <a:font script="Hans" typeface="等线 Light"/>
+        <a:font script="Hant" typeface="新細明體"/>
+        <a:font script="Arab" typeface="Times New Roman"/>
+        <a:font script="Hebr" typeface="Times New Roman"/>
+        <a:font script="Thai" typeface="Angsana New"/>
+        <a:font script="Ethi" typeface="Nyala"/>
+        <a:font script="Beng" typeface="Vrinda"/>
+        <a:font script="Gujr" typeface="Shruti"/>
+        <a:font script="Khmr" typeface="MoolBoran"/>
+        <a:font script="Knda" typeface="Tunga"/>
+        <a:font script="Guru" typeface="Raavi"/>
+        <a:font script="Cans" typeface="Euphemia"/>
+        <a:font script="Cher" typeface="Plantagenet Cherokee"/>
+        <a:font script="Yiii" typeface="Microsoft Yi Baiti"/>
+        <a:font script="Tibt" typeface="Microsoft Himalaya"/>
+        <a:font script="Thaa" typeface="MV Boli"/>
+        <a:font script="Deva" typeface="Mangal"/>
+        <a:font script="Telu" typeface="Gautami"/>
+        <a:font script="Taml" typeface="Latha"/>
+        <a:font script="Syrc" typeface="Estrangelo Edessa"/>
+        <a:font script="Orya" typeface="Kalinga"/>
+        <a:font script="Mlym" typeface="Kartika"/>
+        <a:font script="Laoo" typeface="DokChampa"/>
+        <a:font script="Sinh" typeface="Iskoola Pota"/>
+        <a:font script="Mong" typeface="Mongolian Baiti"/>
+        <a:font script="Viet" typeface="Times New Roman"/>
+        <a:font script="Uigh" typeface="Microsoft Uighur"/>
+        <a:font script="Geor" typeface="Sylfaen"/>
+        <a:font script="Armn" typeface="Arial"/>
+        <a:font script="Bugi" typeface="Leelawadee UI"/>
+        <a:font script="Bopo" typeface="Microsoft JhengHei"/>
+        <a:font script="Java" typeface="Javanese Text"/>
+        <a:font script="Lisu" typeface="Segoe UI"/>
+        <a:font script="Mymr" typeface="Myanmar Text"/>
+        <a:font script="Nkoo" typeface="Ebrima"/>
+        <a:font script="Olck" typeface="Nirmala UI"/>
+        <a:font script="Osma" typeface="Ebrima"/>
+        <a:font script="Phag" typeface="Phagspa"/>
+        <a:font script="Syrn" typeface="Estrangelo Edessa"/>
+        <a:font script="Syrj" typeface="Estrangelo Edessa"/>
+        <a:font script="Syre" typeface="Estrangelo Edessa"/>
+        <a:font script="Sora" typeface="Nirmala UI"/>
+        <a:font script="Tale" typeface="Microsoft Tai Le"/>
+        <a:font script="Talu" typeface="Microsoft New Tai Lue"/>
+        <a:font script="Tfng" typeface="Ebrima"/>
+      </a:majorFont>
+      <a:minorFont>
+        <a:latin typeface="等线" panose="02110004020202020204"/>
+        <a:ea typeface=""/>
+        <a:cs typeface=""/>
+        <a:font script="Jpan" typeface="游ゴシック"/>
+        <a:font script="Hang" typeface="맑은 고딕"/>
+        <a:font script="Hans" typeface="等线"/>
+        <a:font script="Hant" typeface="新細明體"/>
+        <a:font script="Arab" typeface="Arial"/>
+        <a:font script="Hebr" typeface="Arial"/>
+        <a:font script="Thai" typeface="Cordia New"/>
+        <a:font script="Ethi" typeface="Nyala"/>
+        <a:font script="Beng" typeface="Vrinda"/>
+        <a:font script="Gujr" typeface="Shruti"/>
+        <a:font script="Khmr" typeface="DaunPenh"/>
+        <a:font script="Knda" typeface="Tunga"/>
+        <a:font script="Guru" typeface="Raavi"/>
+        <a:font script="Cans" typeface="Euphemia"/>
+        <a:font script="Cher" typeface="Plantagenet Cherokee"/>
+        <a:font script="Yiii" typeface="Microsoft Yi Baiti"/>
+        <a:font script="Tibt" typeface="Microsoft Himalaya"/>
+        <a:font script="Thaa" typeface="MV Boli"/>
+        <a:font script="Deva" typeface="Mangal"/>
+        <a:font script="Telu" typeface="Gautami"/>
+        <a:font script="Taml" typeface="Latha"/>
+        <a:font script="Syrc" typeface="Estrangelo Edessa"/>
+        <a:font script="Orya" typeface="Kalinga"/>
+        <a:font script="Mlym" typeface="Kartika"/>
+        <a:font script="Laoo" typeface="DokChampa"/>
+        <a:font script="Sinh" typeface="Iskoola Pota"/>
+        <a:font script="Mong" typeface="Mongolian Baiti"/>
+        <a:font script="Viet" typeface="Arial"/>
+        <a:font script="Uigh" typeface="Microsoft Uighur"/>
+        <a:font script="Geor" typeface="Sylfaen"/>
+        <a:font script="Armn" typeface="Arial"/>
+        <a:font script="Bugi" typeface="Leelawadee UI"/>
+        <a:font script="Bopo" typeface="Microsoft JhengHei"/>
+        <a:font script="Java" typeface="Javanese Text"/>
+        <a:font script="Lisu" typeface="Segoe UI"/>
+        <a:font script="Mymr" typeface="Myanmar Text"/>
+        <a:font script="Nkoo" typeface="Ebrima"/>
+        <a:font script="Olck" typeface="Nirmala UI"/>
+        <a:font script="Osma" typeface="Ebrima"/>
+        <a:font script="Phag" typeface="Phagspa"/>
+        <a:font script="Syrn" typeface="Estrangelo Edessa"/>
+        <a:font script="Syrj" typeface="Estrangelo Edessa"/>
+        <a:font script="Syre" typeface="Estrangelo Edessa"/>
+        <a:font script="Sora" typeface="Nirmala UI"/>
+        <a:font script="Tale" typeface="Microsoft Tai Le"/>
+        <a:font script="Talu" typeface="Microsoft New Tai Lue"/>
+        <a:font script="Tfng" typeface="Ebrima"/>
+      </a:minorFont>
+    </a:fontScheme>
+    <a:fmtScheme name="Office">
+      <a:fillStyleLst>
+        <a:solidFill>
+          <a:schemeClr val="phClr"/>
+        </a:solidFill>
+        <a:gradFill rotWithShape="1">
+          <a:gsLst>
+            <a:gs pos="0">
+              <a:schemeClr val="phClr">
+                <a:lumMod val="110000"/>
+                <a:satMod val="105000"/>
+                <a:tint val="67000"/>
+              </a:schemeClr>
+            </a:gs>
+            <a:gs pos="50000">
+              <a:schemeClr val="phClr">
+                <a:lumMod val="105000"/>
+                <a:satMod val="103000"/>
+                <a:tint val="73000"/>
+              </a:schemeClr>
+            </a:gs>
+            <a:gs pos="100000">
+              <a:schemeClr val="phClr">
+                <a:lumMod val="105000"/>
+                <a:satMod val="109000"/>
+                <a:tint val="81000"/>
+              </a:schemeClr>
+            </a:gs>
+          </a:gsLst>
+          <a:lin ang="5400000" scaled="0"/>
+        </a:gradFill>
+        <a:gradFill rotWithShape="1">
+          <a:gsLst>
+            <a:gs pos="0">
+              <a:schemeClr val="phClr">
+                <a:satMod val="103000"/>
+                <a:lumMod val="102000"/>
+                <a:tint val="94000"/>
+              </a:schemeClr>
+            </a:gs>
+            <a:gs pos="50000">
+              <a:schemeClr val="phClr">
+                <a:satMod val="110000"/>
+                <a:lumMod val="100000"/>
+                <a:shade val="100000"/>
+              </a:schemeClr>
+            </a:gs>
+            <a:gs pos="100000">
+              <a:schemeClr val="phClr">
+                <a:lumMod val="99000"/>
+                <a:satMod val="120000"/>
+                <a:shade val="78000"/>
+              </a:schemeClr>
+            </a:gs>
+          </a:gsLst>
+          <a:lin ang="5400000" scaled="0"/>
+        </a:gradFill>
+      </a:fillStyleLst>
+      <a:lnStyleLst>
+        <a:ln w="12700" cap="flat" cmpd="sng" algn="ctr">
+          <a:solidFill>
+            <a:schemeClr val="phClr"/>
+          </a:solidFill>
+          <a:prstDash val="solid"/>
+          <a:miter lim="800000"/>
+        </a:ln>
+        <a:ln w="19050" cap="flat" cmpd="sng" algn="ctr">
+          <a:solidFill>
+            <a:schemeClr val="phClr"/>
+          </a:solidFill>
+          <a:prstDash val="solid"/>
+          <a:miter lim="800000"/>
+        </a:ln>
+        <a:ln w="25400" cap="flat" cmpd="sng" algn="ctr">
+          <a:solidFill>
+            <a:schemeClr val="phClr"/>
+          </a:solidFill>
+          <a:prstDash val="solid"/>
+          <a:miter lim="800000"/>
+        </a:ln>
+      </a:lnStyleLst>
+      <a:effectStyleLst>
+        <a:effectStyle>
+          <a:effectLst/>
+        </a:effectStyle>
+        <a:effectStyle>
+          <a:effectLst/>
+        </a:effectStyle>
+        <a:effectStyle>
+          <a:effectLst>
+            <a:outerShdw blurRad="57150" dist="19050" dir="5400000" algn="ctr" rotWithShape="0">
+              <a:srgbClr val="000000">
+                <a:alpha val="63000"/>
+              </a:srgbClr>
+            </a:outerShdw>
+          </a:effectLst>
+        </a:effectStyle>
+      </a:effectStyleLst>
+      <a:bgFillStyleLst>
+        <a:solidFill>
+          <a:schemeClr val="phClr"/>
+        </a:solidFill>
+        <a:solidFill>
+          <a:schemeClr val="phClr">
+            <a:tint val="95000"/>
+            <a:satMod val="170000"/>
+          </a:schemeClr>
+        </a:solidFill>
+        <a:gradFill rotWithShape="1">
+          <a:gsLst>
+            <a:gs pos="0">
+              <a:schemeClr val="phClr">
+                <a:tint val="93000"/>
+                <a:satMod val="150000"/>
+                <a:shade val="98000"/>
+                <a:lumMod val="102000"/>
+              </a:schemeClr>
+            </a:gs>
+            <a:gs pos="50000">
+              <a:schemeClr val="phClr">
+                <a:tint val="98000"/>
+                <a:satMod val="130000"/>
+                <a:shade val="90000"/>
+                <a:lumMod val="103000"/>
+              </a:schemeClr>
+            </a:gs>
+            <a:gs pos="100000">
+              <a:schemeClr val="phClr">
+                <a:shade val="63000"/>
+                <a:satMod val="120000"/>
+              </a:schemeClr>
+            </a:gs>
+          </a:gsLst>
+          <a:lin ang="5400000" scaled="0"/>
+        </a:gradFill>
+      </a:bgFillStyleLst>
+    </a:fmtScheme>
+  </a:themeElements>
+  <a:objectDefaults>
+    <a:lnDef>
+      <a:spPr/>
+      <a:bodyPr/>
+      <a:lstStyle/>
+      <a:style>
+        <a:lnRef idx="2">
+          <a:schemeClr val="accent1"/>
+        </a:lnRef>
+        <a:fillRef idx="0">
+          <a:schemeClr val="accent1"/>
+        </a:fillRef>
+        <a:effectRef idx="1">
+          <a:schemeClr val="accent1"/>
+        </a:effectRef>
+        <a:fontRef idx="minor">
+          <a:schemeClr val="tx1"/>
+        </a:fontRef>
+      </a:style>
+    </a:lnDef>
+  </a:objectDefaults>
+  <a:extraClrSchemeLst/>
+  <a:extLst>
+    <a:ext uri="{05A4C25C-085E-4340-85A3-A5531E510DB2}">
+      <thm15:themeFamily xmlns:thm15="http://schemas.microsoft.com/office/thememl/2012/main" name="Office Theme" id="{2E142A2C-CD16-42D6-873A-C26D2A0506FA}" vid="{1BDDFF52-6CD6-40A5-AB3C-68EB2F1E4D0A}"/>
+    </a:ext>
+  </a:extLst>
+</a:theme>
 </file>
</xml_diff>